<commit_message>
edits to test knit file
</commit_message>
<xml_diff>
--- a/src/notebooks/test-knit.pptx
+++ b/src/notebooks/test-knit.pptx
@@ -8,6 +8,7 @@
     <p:sldId id="256" r:id="rId2"/>
     <p:sldId id="257" r:id="rId3"/>
     <p:sldId id="258" r:id="rId4"/>
+    <p:sldId id="259" r:id="rId5"/>
   </p:sldIdLst>
   <p:sldSz cx="9144000" cy="6858000" type="screen4x3"/>
   <p:notesSz cx="7315200" cy="9601200"/>
@@ -5025,7 +5026,7 @@
       </p:sp>
       <p:graphicFrame xmlns:a="http://schemas.openxmlformats.org/drawingml/2006/main" xmlns:r="http://schemas.openxmlformats.org/officeDocument/2006/relationships" xmlns:p="http://schemas.openxmlformats.org/presentationml/2006/main">
         <p:nvGraphicFramePr>
-          <p:cNvPr id="119582273" name=""/>
+          <p:cNvPr id="54337936" name=""/>
           <p:cNvGraphicFramePr>
             <a:graphicFrameLocks noGrp="true"/>
           </p:cNvGraphicFramePr>
@@ -5053,7 +5054,7 @@
                 <a:gridCol w="478100"/>
                 <a:gridCol w="509205"/>
                 <a:gridCol w="509205"/>
-                <a:gridCol w="765753"/>
+                <a:gridCol w="571347"/>
               </a:tblGrid>
               <a:tr h="288753">
                 <a:tc>
@@ -6923,7 +6924,7 @@
                             </a:srgbClr>
                           </a:highlight>
                         </a:rPr>
-                        <a:t>35.000</a:t>
+                        <a:t>35</a:t>
                       </a:r>
                     </a:p>
                   </a:txBody>
@@ -7877,7 +7878,7 @@
                             </a:srgbClr>
                           </a:highlight>
                         </a:rPr>
-                        <a:t>1.000</a:t>
+                        <a:t>1</a:t>
                       </a:r>
                     </a:p>
                   </a:txBody>
@@ -8831,7 +8832,7 @@
                             </a:srgbClr>
                           </a:highlight>
                         </a:rPr>
-                        <a:t>9.000</a:t>
+                        <a:t>9</a:t>
                       </a:r>
                     </a:p>
                   </a:txBody>
@@ -9785,7 +9786,7 @@
                             </a:srgbClr>
                           </a:highlight>
                         </a:rPr>
-                        <a:t>1.000</a:t>
+                        <a:t>1</a:t>
                       </a:r>
                     </a:p>
                   </a:txBody>
@@ -10739,7 +10740,7 @@
                             </a:srgbClr>
                           </a:highlight>
                         </a:rPr>
-                        <a:t>107.000</a:t>
+                        <a:t>107</a:t>
                       </a:r>
                     </a:p>
                   </a:txBody>
@@ -11693,7 +11694,7 @@
                             </a:srgbClr>
                           </a:highlight>
                         </a:rPr>
-                        <a:t>24.000</a:t>
+                        <a:t>24</a:t>
                       </a:r>
                     </a:p>
                   </a:txBody>
@@ -12647,7 +12648,7 @@
                             </a:srgbClr>
                           </a:highlight>
                         </a:rPr>
-                        <a:t>15.000</a:t>
+                        <a:t>15</a:t>
                       </a:r>
                     </a:p>
                   </a:txBody>
@@ -13601,7 +13602,3596 @@
                             </a:srgbClr>
                           </a:highlight>
                         </a:rPr>
-                        <a:t>192.000</a:t>
+                        <a:t>192</a:t>
+                      </a:r>
+                    </a:p>
+                  </a:txBody>
+                  <a:tcPr anchor="ctr" marB="0" marT="0" marR="0" marL="0">
+                    <a:lnL w="0" cmpd="sng" algn="ctr" cap="flat">
+                      <a:solidFill>
+                        <a:srgbClr val="FFFFFF">
+                          <a:alpha val="0"/>
+                        </a:srgbClr>
+                      </a:solidFill>
+                      <a:prstDash val="solid"/>
+                    </a:lnL>
+                    <a:lnR w="0" cmpd="sng" algn="ctr" cap="flat">
+                      <a:solidFill>
+                        <a:srgbClr val="FFFFFF">
+                          <a:alpha val="0"/>
+                        </a:srgbClr>
+                      </a:solidFill>
+                      <a:prstDash val="solid"/>
+                    </a:lnR>
+                    <a:lnT w="0" cmpd="sng" algn="ctr" cap="flat">
+                      <a:solidFill>
+                        <a:srgbClr val="FFFFFF">
+                          <a:alpha val="0"/>
+                        </a:srgbClr>
+                      </a:solidFill>
+                      <a:prstDash val="solid"/>
+                    </a:lnT>
+                    <a:lnB w="25400" cmpd="sng" algn="ctr" cap="flat">
+                      <a:solidFill>
+                        <a:srgbClr val="000000">
+                          <a:alpha val="100000"/>
+                        </a:srgbClr>
+                      </a:solidFill>
+                      <a:prstDash val="solid"/>
+                    </a:lnB>
+                  </a:tcPr>
+                </a:tc>
+              </a:tr>
+            </a:tbl>
+          </a:graphicData>
+        </a:graphic>
+      </p:graphicFrame>
+    </p:spTree>
+  </p:cSld>
+</p:sld>
+</file>
+
+<file path=ppt/slides/slide4.xml><?xml version="1.0" encoding="utf-8"?>
+<p:sld xmlns:a="http://schemas.openxmlformats.org/drawingml/2006/main" xmlns:r="http://schemas.openxmlformats.org/officeDocument/2006/relationships" xmlns:p="http://schemas.openxmlformats.org/presentationml/2006/main">
+  <p:cSld>
+    <p:spTree>
+      <p:nvGrpSpPr>
+        <p:cNvPr id="1" name=""/>
+        <p:cNvGrpSpPr/>
+        <p:nvPr/>
+      </p:nvGrpSpPr>
+      <p:grpSpPr>
+        <a:xfrm>
+          <a:off x="0" y="0"/>
+          <a:ext cx="0" cy="0"/>
+          <a:chOff x="0" y="0"/>
+          <a:chExt cx="0" cy="0"/>
+        </a:xfrm>
+      </p:grpSpPr>
+      <p:sp>
+        <p:nvSpPr>
+          <p:cNvPr id="2" name="Title 1"/>
+          <p:cNvSpPr>
+            <a:spLocks noGrp="1"/>
+          </p:cNvSpPr>
+          <p:nvPr>
+            <p:ph type="title"/>
+          </p:nvPr>
+        </p:nvSpPr>
+        <p:spPr/>
+        <p:txBody>
+          <a:bodyPr/>
+          <a:lstStyle/>
+          <a:p>
+            <a:pPr lvl="0" marL="0" indent="0">
+              <a:buNone/>
+            </a:pPr>
+            <a:r>
+              <a:rPr/>
+              <a:t>Forest</a:t>
+            </a:r>
+            <a:r>
+              <a:rPr/>
+              <a:t> </a:t>
+            </a:r>
+            <a:r>
+              <a:rPr/>
+              <a:t>Park</a:t>
+            </a:r>
+            <a:r>
+              <a:rPr/>
+              <a:t> </a:t>
+            </a:r>
+            <a:r>
+              <a:rPr/>
+              <a:t>Southeast:</a:t>
+            </a:r>
+            <a:r>
+              <a:rPr/>
+              <a:t> </a:t>
+            </a:r>
+            <a:r>
+              <a:rPr/>
+              <a:t>August</a:t>
+            </a:r>
+            <a:r>
+              <a:rPr/>
+              <a:t> </a:t>
+            </a:r>
+            <a:r>
+              <a:rPr/>
+              <a:t>2019</a:t>
+            </a:r>
+          </a:p>
+        </p:txBody>
+      </p:sp>
+      <p:graphicFrame xmlns:a="http://schemas.openxmlformats.org/drawingml/2006/main" xmlns:r="http://schemas.openxmlformats.org/officeDocument/2006/relationships" xmlns:p="http://schemas.openxmlformats.org/presentationml/2006/main">
+        <p:nvGraphicFramePr>
+          <p:cNvPr id="75511293" name=""/>
+          <p:cNvGraphicFramePr>
+            <a:graphicFrameLocks noGrp="true"/>
+          </p:cNvGraphicFramePr>
+          <p:nvPr/>
+        </p:nvGraphicFramePr>
+        <p:xfrm rot="0">
+          <a:off x="914400" y="1828800"/>
+          <a:ext cx="9144000" cy="5486400"/>
+        </p:xfrm>
+        <a:graphic>
+          <a:graphicData uri="http://schemas.openxmlformats.org/drawingml/2006/table">
+            <a:tbl>
+              <a:tblPr/>
+              <a:tblGrid>
+                <a:gridCol w="1472030"/>
+                <a:gridCol w="1394131"/>
+              </a:tblGrid>
+              <a:tr h="262758">
+                <a:tc>
+                  <a:txBody>
+                    <a:bodyPr/>
+                    <a:lstStyle/>
+                    <a:p>
+                      <a:pPr algn="l" marL="63500" marR="63500">
+                        <a:spcBef>
+                          <a:spcPts val="200"/>
+                        </a:spcBef>
+                        <a:spcAft>
+                          <a:spcPts val="200"/>
+                        </a:spcAft>
+                        <a:buNone/>
+                      </a:pPr>
+                      <a:r>
+                        <a:rPr sz="1100">
+                          <a:solidFill>
+                            <a:srgbClr val="111111">
+                              <a:alpha val="100000"/>
+                            </a:srgbClr>
+                          </a:solidFill>
+                          <a:latin typeface="Arial"/>
+                          <a:cs typeface="Arial"/>
+                          <a:highlight>
+                            <a:srgbClr val="FFFFFF">
+                              <a:alpha val="0"/>
+                            </a:srgbClr>
+                          </a:highlight>
+                        </a:rPr>
+                        <a:t>Part 1 Crimes</a:t>
+                      </a:r>
+                    </a:p>
+                  </a:txBody>
+                  <a:tcPr anchor="ctr" marB="0" marT="0" marR="0" marL="0">
+                    <a:lnL w="0" cmpd="sng" algn="ctr" cap="flat">
+                      <a:solidFill>
+                        <a:srgbClr val="FFFFFF">
+                          <a:alpha val="0"/>
+                        </a:srgbClr>
+                      </a:solidFill>
+                      <a:prstDash val="solid"/>
+                    </a:lnL>
+                    <a:lnR w="0" cmpd="sng" algn="ctr" cap="flat">
+                      <a:solidFill>
+                        <a:srgbClr val="FFFFFF">
+                          <a:alpha val="0"/>
+                        </a:srgbClr>
+                      </a:solidFill>
+                      <a:prstDash val="solid"/>
+                    </a:lnR>
+                    <a:lnT w="25400" cmpd="sng" algn="ctr" cap="flat">
+                      <a:solidFill>
+                        <a:srgbClr val="000000">
+                          <a:alpha val="100000"/>
+                        </a:srgbClr>
+                      </a:solidFill>
+                      <a:prstDash val="solid"/>
+                    </a:lnT>
+                    <a:lnB w="25400" cmpd="sng" algn="ctr" cap="flat">
+                      <a:solidFill>
+                        <a:srgbClr val="000000">
+                          <a:alpha val="100000"/>
+                        </a:srgbClr>
+                      </a:solidFill>
+                      <a:prstDash val="solid"/>
+                    </a:lnB>
+                  </a:tcPr>
+                </a:tc>
+                <a:tc>
+                  <a:txBody>
+                    <a:bodyPr/>
+                    <a:lstStyle/>
+                    <a:p>
+                      <a:pPr algn="r" marL="63500" marR="63500">
+                        <a:spcBef>
+                          <a:spcPts val="200"/>
+                        </a:spcBef>
+                        <a:spcAft>
+                          <a:spcPts val="200"/>
+                        </a:spcAft>
+                        <a:buNone/>
+                      </a:pPr>
+                      <a:r>
+                        <a:rPr sz="1100">
+                          <a:solidFill>
+                            <a:srgbClr val="111111">
+                              <a:alpha val="100000"/>
+                            </a:srgbClr>
+                          </a:solidFill>
+                          <a:latin typeface="Arial"/>
+                          <a:cs typeface="Arial"/>
+                          <a:highlight>
+                            <a:srgbClr val="FFFFFF">
+                              <a:alpha val="0"/>
+                            </a:srgbClr>
+                          </a:highlight>
+                        </a:rPr>
+                        <a:t>Number of Crimes</a:t>
+                      </a:r>
+                    </a:p>
+                  </a:txBody>
+                  <a:tcPr anchor="ctr" marB="0" marT="0" marR="0" marL="0">
+                    <a:lnL w="0" cmpd="sng" algn="ctr" cap="flat">
+                      <a:solidFill>
+                        <a:srgbClr val="FFFFFF">
+                          <a:alpha val="0"/>
+                        </a:srgbClr>
+                      </a:solidFill>
+                      <a:prstDash val="solid"/>
+                    </a:lnL>
+                    <a:lnR w="0" cmpd="sng" algn="ctr" cap="flat">
+                      <a:solidFill>
+                        <a:srgbClr val="FFFFFF">
+                          <a:alpha val="0"/>
+                        </a:srgbClr>
+                      </a:solidFill>
+                      <a:prstDash val="solid"/>
+                    </a:lnR>
+                    <a:lnT w="25400" cmpd="sng" algn="ctr" cap="flat">
+                      <a:solidFill>
+                        <a:srgbClr val="000000">
+                          <a:alpha val="100000"/>
+                        </a:srgbClr>
+                      </a:solidFill>
+                      <a:prstDash val="solid"/>
+                    </a:lnT>
+                    <a:lnB w="25400" cmpd="sng" algn="ctr" cap="flat">
+                      <a:solidFill>
+                        <a:srgbClr val="000000">
+                          <a:alpha val="100000"/>
+                        </a:srgbClr>
+                      </a:solidFill>
+                      <a:prstDash val="solid"/>
+                    </a:lnB>
+                  </a:tcPr>
+                </a:tc>
+              </a:tr>
+              <a:tr h="288555">
+                <a:tc>
+                  <a:txBody>
+                    <a:bodyPr/>
+                    <a:lstStyle/>
+                    <a:p>
+                      <a:pPr algn="l" marL="63500" marR="63500">
+                        <a:spcBef>
+                          <a:spcPts val="200"/>
+                        </a:spcBef>
+                        <a:spcAft>
+                          <a:spcPts val="200"/>
+                        </a:spcAft>
+                        <a:buNone/>
+                      </a:pPr>
+                      <a:r>
+                        <a:rPr sz="1100">
+                          <a:solidFill>
+                            <a:srgbClr val="111111">
+                              <a:alpha val="100000"/>
+                            </a:srgbClr>
+                          </a:solidFill>
+                          <a:latin typeface="Arial"/>
+                          <a:cs typeface="Arial"/>
+                          <a:highlight>
+                            <a:srgbClr val="FFFFFF">
+                              <a:alpha val="0"/>
+                            </a:srgbClr>
+                          </a:highlight>
+                        </a:rPr>
+                        <a:t>Burgalry</a:t>
+                      </a:r>
+                    </a:p>
+                  </a:txBody>
+                  <a:tcPr anchor="ctr" marB="0" marT="0" marR="0" marL="0">
+                    <a:lnL w="0" cmpd="sng" algn="ctr" cap="flat">
+                      <a:solidFill>
+                        <a:srgbClr val="FFFFFF">
+                          <a:alpha val="0"/>
+                        </a:srgbClr>
+                      </a:solidFill>
+                      <a:prstDash val="solid"/>
+                    </a:lnL>
+                    <a:lnR w="0" cmpd="sng" algn="ctr" cap="flat">
+                      <a:solidFill>
+                        <a:srgbClr val="FFFFFF">
+                          <a:alpha val="0"/>
+                        </a:srgbClr>
+                      </a:solidFill>
+                      <a:prstDash val="solid"/>
+                    </a:lnR>
+                    <a:lnT w="0" cmpd="sng" algn="ctr" cap="flat">
+                      <a:solidFill>
+                        <a:srgbClr val="FFFFFF">
+                          <a:alpha val="0"/>
+                        </a:srgbClr>
+                      </a:solidFill>
+                      <a:prstDash val="solid"/>
+                    </a:lnT>
+                    <a:lnB w="0" cmpd="sng" algn="ctr" cap="flat">
+                      <a:solidFill>
+                        <a:srgbClr val="FFFFFF">
+                          <a:alpha val="0"/>
+                        </a:srgbClr>
+                      </a:solidFill>
+                      <a:prstDash val="solid"/>
+                    </a:lnB>
+                  </a:tcPr>
+                </a:tc>
+                <a:tc>
+                  <a:txBody>
+                    <a:bodyPr/>
+                    <a:lstStyle/>
+                    <a:p>
+                      <a:pPr algn="r" marL="63500" marR="63500">
+                        <a:spcBef>
+                          <a:spcPts val="200"/>
+                        </a:spcBef>
+                        <a:spcAft>
+                          <a:spcPts val="200"/>
+                        </a:spcAft>
+                        <a:buNone/>
+                      </a:pPr>
+                      <a:r>
+                        <a:rPr sz="1100">
+                          <a:solidFill>
+                            <a:srgbClr val="111111">
+                              <a:alpha val="100000"/>
+                            </a:srgbClr>
+                          </a:solidFill>
+                          <a:latin typeface="Arial"/>
+                          <a:cs typeface="Arial"/>
+                          <a:highlight>
+                            <a:srgbClr val="FFFFFF">
+                              <a:alpha val="0"/>
+                            </a:srgbClr>
+                          </a:highlight>
+                        </a:rPr>
+                        <a:t>1</a:t>
+                      </a:r>
+                    </a:p>
+                  </a:txBody>
+                  <a:tcPr anchor="ctr" marB="0" marT="0" marR="0" marL="0">
+                    <a:lnL w="0" cmpd="sng" algn="ctr" cap="flat">
+                      <a:solidFill>
+                        <a:srgbClr val="FFFFFF">
+                          <a:alpha val="0"/>
+                        </a:srgbClr>
+                      </a:solidFill>
+                      <a:prstDash val="solid"/>
+                    </a:lnL>
+                    <a:lnR w="0" cmpd="sng" algn="ctr" cap="flat">
+                      <a:solidFill>
+                        <a:srgbClr val="FFFFFF">
+                          <a:alpha val="0"/>
+                        </a:srgbClr>
+                      </a:solidFill>
+                      <a:prstDash val="solid"/>
+                    </a:lnR>
+                    <a:lnT w="0" cmpd="sng" algn="ctr" cap="flat">
+                      <a:solidFill>
+                        <a:srgbClr val="FFFFFF">
+                          <a:alpha val="0"/>
+                        </a:srgbClr>
+                      </a:solidFill>
+                      <a:prstDash val="solid"/>
+                    </a:lnT>
+                    <a:lnB w="0" cmpd="sng" algn="ctr" cap="flat">
+                      <a:solidFill>
+                        <a:srgbClr val="FFFFFF">
+                          <a:alpha val="0"/>
+                        </a:srgbClr>
+                      </a:solidFill>
+                      <a:prstDash val="solid"/>
+                    </a:lnB>
+                  </a:tcPr>
+                </a:tc>
+              </a:tr>
+              <a:tr h="288555">
+                <a:tc>
+                  <a:txBody>
+                    <a:bodyPr/>
+                    <a:lstStyle/>
+                    <a:p>
+                      <a:pPr algn="l" marL="63500" marR="63500">
+                        <a:spcBef>
+                          <a:spcPts val="200"/>
+                        </a:spcBef>
+                        <a:spcAft>
+                          <a:spcPts val="200"/>
+                        </a:spcAft>
+                        <a:buNone/>
+                      </a:pPr>
+                      <a:r>
+                        <a:rPr sz="1100">
+                          <a:solidFill>
+                            <a:srgbClr val="111111">
+                              <a:alpha val="100000"/>
+                            </a:srgbClr>
+                          </a:solidFill>
+                          <a:latin typeface="Arial"/>
+                          <a:cs typeface="Arial"/>
+                          <a:highlight>
+                            <a:srgbClr val="FFFFFF">
+                              <a:alpha val="0"/>
+                            </a:srgbClr>
+                          </a:highlight>
+                        </a:rPr>
+                        <a:t>Larceny</a:t>
+                      </a:r>
+                    </a:p>
+                  </a:txBody>
+                  <a:tcPr anchor="ctr" marB="0" marT="0" marR="0" marL="0">
+                    <a:lnL w="0" cmpd="sng" algn="ctr" cap="flat">
+                      <a:solidFill>
+                        <a:srgbClr val="FFFFFF">
+                          <a:alpha val="0"/>
+                        </a:srgbClr>
+                      </a:solidFill>
+                      <a:prstDash val="solid"/>
+                    </a:lnL>
+                    <a:lnR w="0" cmpd="sng" algn="ctr" cap="flat">
+                      <a:solidFill>
+                        <a:srgbClr val="FFFFFF">
+                          <a:alpha val="0"/>
+                        </a:srgbClr>
+                      </a:solidFill>
+                      <a:prstDash val="solid"/>
+                    </a:lnR>
+                    <a:lnT w="0" cmpd="sng" algn="ctr" cap="flat">
+                      <a:solidFill>
+                        <a:srgbClr val="FFFFFF">
+                          <a:alpha val="0"/>
+                        </a:srgbClr>
+                      </a:solidFill>
+                      <a:prstDash val="solid"/>
+                    </a:lnT>
+                    <a:lnB w="0" cmpd="sng" algn="ctr" cap="flat">
+                      <a:solidFill>
+                        <a:srgbClr val="FFFFFF">
+                          <a:alpha val="0"/>
+                        </a:srgbClr>
+                      </a:solidFill>
+                      <a:prstDash val="solid"/>
+                    </a:lnB>
+                  </a:tcPr>
+                </a:tc>
+                <a:tc>
+                  <a:txBody>
+                    <a:bodyPr/>
+                    <a:lstStyle/>
+                    <a:p>
+                      <a:pPr algn="r" marL="63500" marR="63500">
+                        <a:spcBef>
+                          <a:spcPts val="200"/>
+                        </a:spcBef>
+                        <a:spcAft>
+                          <a:spcPts val="200"/>
+                        </a:spcAft>
+                        <a:buNone/>
+                      </a:pPr>
+                      <a:r>
+                        <a:rPr sz="1100">
+                          <a:solidFill>
+                            <a:srgbClr val="111111">
+                              <a:alpha val="100000"/>
+                            </a:srgbClr>
+                          </a:solidFill>
+                          <a:latin typeface="Arial"/>
+                          <a:cs typeface="Arial"/>
+                          <a:highlight>
+                            <a:srgbClr val="FFFFFF">
+                              <a:alpha val="0"/>
+                            </a:srgbClr>
+                          </a:highlight>
+                        </a:rPr>
+                        <a:t>17</a:t>
+                      </a:r>
+                    </a:p>
+                  </a:txBody>
+                  <a:tcPr anchor="ctr" marB="0" marT="0" marR="0" marL="0">
+                    <a:lnL w="0" cmpd="sng" algn="ctr" cap="flat">
+                      <a:solidFill>
+                        <a:srgbClr val="FFFFFF">
+                          <a:alpha val="0"/>
+                        </a:srgbClr>
+                      </a:solidFill>
+                      <a:prstDash val="solid"/>
+                    </a:lnL>
+                    <a:lnR w="0" cmpd="sng" algn="ctr" cap="flat">
+                      <a:solidFill>
+                        <a:srgbClr val="FFFFFF">
+                          <a:alpha val="0"/>
+                        </a:srgbClr>
+                      </a:solidFill>
+                      <a:prstDash val="solid"/>
+                    </a:lnR>
+                    <a:lnT w="0" cmpd="sng" algn="ctr" cap="flat">
+                      <a:solidFill>
+                        <a:srgbClr val="FFFFFF">
+                          <a:alpha val="0"/>
+                        </a:srgbClr>
+                      </a:solidFill>
+                      <a:prstDash val="solid"/>
+                    </a:lnT>
+                    <a:lnB w="0" cmpd="sng" algn="ctr" cap="flat">
+                      <a:solidFill>
+                        <a:srgbClr val="FFFFFF">
+                          <a:alpha val="0"/>
+                        </a:srgbClr>
+                      </a:solidFill>
+                      <a:prstDash val="solid"/>
+                    </a:lnB>
+                  </a:tcPr>
+                </a:tc>
+              </a:tr>
+              <a:tr h="262559">
+                <a:tc>
+                  <a:txBody>
+                    <a:bodyPr/>
+                    <a:lstStyle/>
+                    <a:p>
+                      <a:pPr algn="l" marL="63500" marR="63500">
+                        <a:spcBef>
+                          <a:spcPts val="200"/>
+                        </a:spcBef>
+                        <a:spcAft>
+                          <a:spcPts val="200"/>
+                        </a:spcAft>
+                        <a:buNone/>
+                      </a:pPr>
+                      <a:r>
+                        <a:rPr sz="1100">
+                          <a:solidFill>
+                            <a:srgbClr val="111111">
+                              <a:alpha val="100000"/>
+                            </a:srgbClr>
+                          </a:solidFill>
+                          <a:latin typeface="Arial"/>
+                          <a:cs typeface="Arial"/>
+                          <a:highlight>
+                            <a:srgbClr val="FFFFFF">
+                              <a:alpha val="0"/>
+                            </a:srgbClr>
+                          </a:highlight>
+                        </a:rPr>
+                        <a:t>Motor Vehicle Theft</a:t>
+                      </a:r>
+                    </a:p>
+                  </a:txBody>
+                  <a:tcPr anchor="ctr" marB="0" marT="0" marR="0" marL="0">
+                    <a:lnL w="0" cmpd="sng" algn="ctr" cap="flat">
+                      <a:solidFill>
+                        <a:srgbClr val="FFFFFF">
+                          <a:alpha val="0"/>
+                        </a:srgbClr>
+                      </a:solidFill>
+                      <a:prstDash val="solid"/>
+                    </a:lnL>
+                    <a:lnR w="0" cmpd="sng" algn="ctr" cap="flat">
+                      <a:solidFill>
+                        <a:srgbClr val="FFFFFF">
+                          <a:alpha val="0"/>
+                        </a:srgbClr>
+                      </a:solidFill>
+                      <a:prstDash val="solid"/>
+                    </a:lnR>
+                    <a:lnT w="0" cmpd="sng" algn="ctr" cap="flat">
+                      <a:solidFill>
+                        <a:srgbClr val="FFFFFF">
+                          <a:alpha val="0"/>
+                        </a:srgbClr>
+                      </a:solidFill>
+                      <a:prstDash val="solid"/>
+                    </a:lnT>
+                    <a:lnB w="0" cmpd="sng" algn="ctr" cap="flat">
+                      <a:solidFill>
+                        <a:srgbClr val="FFFFFF">
+                          <a:alpha val="0"/>
+                        </a:srgbClr>
+                      </a:solidFill>
+                      <a:prstDash val="solid"/>
+                    </a:lnB>
+                  </a:tcPr>
+                </a:tc>
+                <a:tc>
+                  <a:txBody>
+                    <a:bodyPr/>
+                    <a:lstStyle/>
+                    <a:p>
+                      <a:pPr algn="r" marL="63500" marR="63500">
+                        <a:spcBef>
+                          <a:spcPts val="200"/>
+                        </a:spcBef>
+                        <a:spcAft>
+                          <a:spcPts val="200"/>
+                        </a:spcAft>
+                        <a:buNone/>
+                      </a:pPr>
+                      <a:r>
+                        <a:rPr sz="1100">
+                          <a:solidFill>
+                            <a:srgbClr val="111111">
+                              <a:alpha val="100000"/>
+                            </a:srgbClr>
+                          </a:solidFill>
+                          <a:latin typeface="Arial"/>
+                          <a:cs typeface="Arial"/>
+                          <a:highlight>
+                            <a:srgbClr val="FFFFFF">
+                              <a:alpha val="0"/>
+                            </a:srgbClr>
+                          </a:highlight>
+                        </a:rPr>
+                        <a:t>1</a:t>
+                      </a:r>
+                    </a:p>
+                  </a:txBody>
+                  <a:tcPr anchor="ctr" marB="0" marT="0" marR="0" marL="0">
+                    <a:lnL w="0" cmpd="sng" algn="ctr" cap="flat">
+                      <a:solidFill>
+                        <a:srgbClr val="FFFFFF">
+                          <a:alpha val="0"/>
+                        </a:srgbClr>
+                      </a:solidFill>
+                      <a:prstDash val="solid"/>
+                    </a:lnL>
+                    <a:lnR w="0" cmpd="sng" algn="ctr" cap="flat">
+                      <a:solidFill>
+                        <a:srgbClr val="FFFFFF">
+                          <a:alpha val="0"/>
+                        </a:srgbClr>
+                      </a:solidFill>
+                      <a:prstDash val="solid"/>
+                    </a:lnR>
+                    <a:lnT w="0" cmpd="sng" algn="ctr" cap="flat">
+                      <a:solidFill>
+                        <a:srgbClr val="FFFFFF">
+                          <a:alpha val="0"/>
+                        </a:srgbClr>
+                      </a:solidFill>
+                      <a:prstDash val="solid"/>
+                    </a:lnT>
+                    <a:lnB w="0" cmpd="sng" algn="ctr" cap="flat">
+                      <a:solidFill>
+                        <a:srgbClr val="FFFFFF">
+                          <a:alpha val="0"/>
+                        </a:srgbClr>
+                      </a:solidFill>
+                      <a:prstDash val="solid"/>
+                    </a:lnB>
+                  </a:tcPr>
+                </a:tc>
+              </a:tr>
+              <a:tr h="288555">
+                <a:tc>
+                  <a:txBody>
+                    <a:bodyPr/>
+                    <a:lstStyle/>
+                    <a:p>
+                      <a:pPr algn="l" marL="63500" marR="63500">
+                        <a:spcBef>
+                          <a:spcPts val="200"/>
+                        </a:spcBef>
+                        <a:spcAft>
+                          <a:spcPts val="200"/>
+                        </a:spcAft>
+                        <a:buNone/>
+                      </a:pPr>
+                      <a:r>
+                        <a:rPr sz="1100">
+                          <a:solidFill>
+                            <a:srgbClr val="111111">
+                              <a:alpha val="100000"/>
+                            </a:srgbClr>
+                          </a:solidFill>
+                          <a:latin typeface="Arial"/>
+                          <a:cs typeface="Arial"/>
+                          <a:highlight>
+                            <a:srgbClr val="FFFFFF">
+                              <a:alpha val="0"/>
+                            </a:srgbClr>
+                          </a:highlight>
+                        </a:rPr>
+                        <a:t>Robbery</a:t>
+                      </a:r>
+                    </a:p>
+                  </a:txBody>
+                  <a:tcPr anchor="ctr" marB="0" marT="0" marR="0" marL="0">
+                    <a:lnL w="0" cmpd="sng" algn="ctr" cap="flat">
+                      <a:solidFill>
+                        <a:srgbClr val="FFFFFF">
+                          <a:alpha val="0"/>
+                        </a:srgbClr>
+                      </a:solidFill>
+                      <a:prstDash val="solid"/>
+                    </a:lnL>
+                    <a:lnR w="0" cmpd="sng" algn="ctr" cap="flat">
+                      <a:solidFill>
+                        <a:srgbClr val="FFFFFF">
+                          <a:alpha val="0"/>
+                        </a:srgbClr>
+                      </a:solidFill>
+                      <a:prstDash val="solid"/>
+                    </a:lnR>
+                    <a:lnT w="0" cmpd="sng" algn="ctr" cap="flat">
+                      <a:solidFill>
+                        <a:srgbClr val="FFFFFF">
+                          <a:alpha val="0"/>
+                        </a:srgbClr>
+                      </a:solidFill>
+                      <a:prstDash val="solid"/>
+                    </a:lnT>
+                    <a:lnB w="0" cmpd="sng" algn="ctr" cap="flat">
+                      <a:solidFill>
+                        <a:srgbClr val="FFFFFF">
+                          <a:alpha val="0"/>
+                        </a:srgbClr>
+                      </a:solidFill>
+                      <a:prstDash val="solid"/>
+                    </a:lnB>
+                  </a:tcPr>
+                </a:tc>
+                <a:tc>
+                  <a:txBody>
+                    <a:bodyPr/>
+                    <a:lstStyle/>
+                    <a:p>
+                      <a:pPr algn="r" marL="63500" marR="63500">
+                        <a:spcBef>
+                          <a:spcPts val="200"/>
+                        </a:spcBef>
+                        <a:spcAft>
+                          <a:spcPts val="200"/>
+                        </a:spcAft>
+                        <a:buNone/>
+                      </a:pPr>
+                      <a:r>
+                        <a:rPr sz="1100">
+                          <a:solidFill>
+                            <a:srgbClr val="111111">
+                              <a:alpha val="100000"/>
+                            </a:srgbClr>
+                          </a:solidFill>
+                          <a:latin typeface="Arial"/>
+                          <a:cs typeface="Arial"/>
+                          <a:highlight>
+                            <a:srgbClr val="FFFFFF">
+                              <a:alpha val="0"/>
+                            </a:srgbClr>
+                          </a:highlight>
+                        </a:rPr>
+                        <a:t>1</a:t>
+                      </a:r>
+                    </a:p>
+                  </a:txBody>
+                  <a:tcPr anchor="ctr" marB="0" marT="0" marR="0" marL="0">
+                    <a:lnL w="0" cmpd="sng" algn="ctr" cap="flat">
+                      <a:solidFill>
+                        <a:srgbClr val="FFFFFF">
+                          <a:alpha val="0"/>
+                        </a:srgbClr>
+                      </a:solidFill>
+                      <a:prstDash val="solid"/>
+                    </a:lnL>
+                    <a:lnR w="0" cmpd="sng" algn="ctr" cap="flat">
+                      <a:solidFill>
+                        <a:srgbClr val="FFFFFF">
+                          <a:alpha val="0"/>
+                        </a:srgbClr>
+                      </a:solidFill>
+                      <a:prstDash val="solid"/>
+                    </a:lnR>
+                    <a:lnT w="0" cmpd="sng" algn="ctr" cap="flat">
+                      <a:solidFill>
+                        <a:srgbClr val="FFFFFF">
+                          <a:alpha val="0"/>
+                        </a:srgbClr>
+                      </a:solidFill>
+                      <a:prstDash val="solid"/>
+                    </a:lnT>
+                    <a:lnB w="0" cmpd="sng" algn="ctr" cap="flat">
+                      <a:solidFill>
+                        <a:srgbClr val="FFFFFF">
+                          <a:alpha val="0"/>
+                        </a:srgbClr>
+                      </a:solidFill>
+                      <a:prstDash val="solid"/>
+                    </a:lnB>
+                  </a:tcPr>
+                </a:tc>
+              </a:tr>
+              <a:tr h="261369">
+                <a:tc>
+                  <a:txBody>
+                    <a:bodyPr/>
+                    <a:lstStyle/>
+                    <a:p>
+                      <a:pPr algn="l" marL="63500" marR="63500">
+                        <a:spcBef>
+                          <a:spcPts val="200"/>
+                        </a:spcBef>
+                        <a:spcAft>
+                          <a:spcPts val="200"/>
+                        </a:spcAft>
+                        <a:buNone/>
+                      </a:pPr>
+                      <a:r>
+                        <a:rPr sz="1100">
+                          <a:solidFill>
+                            <a:srgbClr val="111111">
+                              <a:alpha val="100000"/>
+                            </a:srgbClr>
+                          </a:solidFill>
+                          <a:latin typeface="Arial"/>
+                          <a:cs typeface="Arial"/>
+                          <a:highlight>
+                            <a:srgbClr val="FFFFFF">
+                              <a:alpha val="0"/>
+                            </a:srgbClr>
+                          </a:highlight>
+                        </a:rPr>
+                        <a:t>Total</a:t>
+                      </a:r>
+                    </a:p>
+                  </a:txBody>
+                  <a:tcPr anchor="ctr" marB="0" marT="0" marR="0" marL="0">
+                    <a:lnL w="0" cmpd="sng" algn="ctr" cap="flat">
+                      <a:solidFill>
+                        <a:srgbClr val="FFFFFF">
+                          <a:alpha val="0"/>
+                        </a:srgbClr>
+                      </a:solidFill>
+                      <a:prstDash val="solid"/>
+                    </a:lnL>
+                    <a:lnR w="0" cmpd="sng" algn="ctr" cap="flat">
+                      <a:solidFill>
+                        <a:srgbClr val="FFFFFF">
+                          <a:alpha val="0"/>
+                        </a:srgbClr>
+                      </a:solidFill>
+                      <a:prstDash val="solid"/>
+                    </a:lnR>
+                    <a:lnT w="0" cmpd="sng" algn="ctr" cap="flat">
+                      <a:solidFill>
+                        <a:srgbClr val="FFFFFF">
+                          <a:alpha val="0"/>
+                        </a:srgbClr>
+                      </a:solidFill>
+                      <a:prstDash val="solid"/>
+                    </a:lnT>
+                    <a:lnB w="25400" cmpd="sng" algn="ctr" cap="flat">
+                      <a:solidFill>
+                        <a:srgbClr val="000000">
+                          <a:alpha val="100000"/>
+                        </a:srgbClr>
+                      </a:solidFill>
+                      <a:prstDash val="solid"/>
+                    </a:lnB>
+                  </a:tcPr>
+                </a:tc>
+                <a:tc>
+                  <a:txBody>
+                    <a:bodyPr/>
+                    <a:lstStyle/>
+                    <a:p>
+                      <a:pPr algn="r" marL="63500" marR="63500">
+                        <a:spcBef>
+                          <a:spcPts val="200"/>
+                        </a:spcBef>
+                        <a:spcAft>
+                          <a:spcPts val="200"/>
+                        </a:spcAft>
+                        <a:buNone/>
+                      </a:pPr>
+                      <a:r>
+                        <a:rPr sz="1100">
+                          <a:solidFill>
+                            <a:srgbClr val="111111">
+                              <a:alpha val="100000"/>
+                            </a:srgbClr>
+                          </a:solidFill>
+                          <a:latin typeface="Arial"/>
+                          <a:cs typeface="Arial"/>
+                          <a:highlight>
+                            <a:srgbClr val="FFFFFF">
+                              <a:alpha val="0"/>
+                            </a:srgbClr>
+                          </a:highlight>
+                        </a:rPr>
+                        <a:t>20</a:t>
+                      </a:r>
+                    </a:p>
+                  </a:txBody>
+                  <a:tcPr anchor="ctr" marB="0" marT="0" marR="0" marL="0">
+                    <a:lnL w="0" cmpd="sng" algn="ctr" cap="flat">
+                      <a:solidFill>
+                        <a:srgbClr val="FFFFFF">
+                          <a:alpha val="0"/>
+                        </a:srgbClr>
+                      </a:solidFill>
+                      <a:prstDash val="solid"/>
+                    </a:lnL>
+                    <a:lnR w="0" cmpd="sng" algn="ctr" cap="flat">
+                      <a:solidFill>
+                        <a:srgbClr val="FFFFFF">
+                          <a:alpha val="0"/>
+                        </a:srgbClr>
+                      </a:solidFill>
+                      <a:prstDash val="solid"/>
+                    </a:lnR>
+                    <a:lnT w="0" cmpd="sng" algn="ctr" cap="flat">
+                      <a:solidFill>
+                        <a:srgbClr val="FFFFFF">
+                          <a:alpha val="0"/>
+                        </a:srgbClr>
+                      </a:solidFill>
+                      <a:prstDash val="solid"/>
+                    </a:lnT>
+                    <a:lnB w="25400" cmpd="sng" algn="ctr" cap="flat">
+                      <a:solidFill>
+                        <a:srgbClr val="000000">
+                          <a:alpha val="100000"/>
+                        </a:srgbClr>
+                      </a:solidFill>
+                      <a:prstDash val="solid"/>
+                    </a:lnB>
+                  </a:tcPr>
+                </a:tc>
+              </a:tr>
+            </a:tbl>
+          </a:graphicData>
+        </a:graphic>
+      </p:graphicFrame>
+      <p:sp>
+        <p:nvSpPr>
+          <p:cNvPr id="3" name="Content Placeholder 2"/>
+          <p:cNvSpPr>
+            <a:spLocks noGrp="1"/>
+          </p:cNvSpPr>
+          <p:nvPr>
+            <p:ph idx="1"/>
+          </p:nvPr>
+        </p:nvSpPr>
+        <p:spPr/>
+        <p:txBody>
+          <a:bodyPr/>
+          <a:lstStyle/>
+          <a:p>
+            <a:pPr lvl="0" marL="1270000" indent="0">
+              <a:buNone/>
+            </a:pPr>
+            <a:r>
+              <a:rPr sz="1800" b="1">
+                <a:solidFill>
+                  <a:srgbClr val="007020"/>
+                </a:solidFill>
+                <a:latin typeface="Courier"/>
+              </a:rPr>
+              <a:t>flextable</a:t>
+            </a:r>
+            <a:r>
+              <a:rPr sz="1800">
+                <a:latin typeface="Courier"/>
+              </a:rPr>
+              <a:t>(fpse_weekDay) </a:t>
+            </a:r>
+            <a:r>
+              <a:rPr sz="1800">
+                <a:solidFill>
+                  <a:srgbClr val="666666"/>
+                </a:solidFill>
+                <a:latin typeface="Courier"/>
+              </a:rPr>
+              <a:t>%&gt;%</a:t>
+            </a:r>
+            <a:r>
+              <a:rPr sz="1800">
+                <a:solidFill>
+                  <a:srgbClr val="4070A0"/>
+                </a:solidFill>
+                <a:latin typeface="Courier"/>
+              </a:rPr>
+              <a:t> </a:t>
+            </a:r>
+            <a:br/>
+            <a:br/>
+            <a:r>
+              <a:rPr sz="1800">
+                <a:solidFill>
+                  <a:srgbClr val="4070A0"/>
+                </a:solidFill>
+                <a:latin typeface="Courier"/>
+              </a:rPr>
+              <a:t>  </a:t>
+            </a:r>
+            <a:r>
+              <a:rPr sz="1800" b="1">
+                <a:solidFill>
+                  <a:srgbClr val="007020"/>
+                </a:solidFill>
+                <a:latin typeface="Courier"/>
+              </a:rPr>
+              <a:t>autofit</a:t>
+            </a:r>
+            <a:r>
+              <a:rPr sz="1800">
+                <a:latin typeface="Courier"/>
+              </a:rPr>
+              <a:t>()</a:t>
+            </a:r>
+          </a:p>
+        </p:txBody>
+      </p:sp>
+      <p:graphicFrame xmlns:a="http://schemas.openxmlformats.org/drawingml/2006/main" xmlns:r="http://schemas.openxmlformats.org/officeDocument/2006/relationships" xmlns:p="http://schemas.openxmlformats.org/presentationml/2006/main">
+        <p:nvGraphicFramePr>
+          <p:cNvPr id="533745242" name=""/>
+          <p:cNvGraphicFramePr>
+            <a:graphicFrameLocks noGrp="true"/>
+          </p:cNvGraphicFramePr>
+          <p:nvPr/>
+        </p:nvGraphicFramePr>
+        <p:xfrm rot="0">
+          <a:off x="914400" y="1828800"/>
+          <a:ext cx="9144000" cy="5486400"/>
+        </p:xfrm>
+        <a:graphic>
+          <a:graphicData uri="http://schemas.openxmlformats.org/drawingml/2006/table">
+            <a:tbl>
+              <a:tblPr/>
+              <a:tblGrid>
+                <a:gridCol w="1293448"/>
+                <a:gridCol w="1394131"/>
+              </a:tblGrid>
+              <a:tr h="290341">
+                <a:tc>
+                  <a:txBody>
+                    <a:bodyPr/>
+                    <a:lstStyle/>
+                    <a:p>
+                      <a:pPr algn="l" marL="63500" marR="63500">
+                        <a:spcBef>
+                          <a:spcPts val="200"/>
+                        </a:spcBef>
+                        <a:spcAft>
+                          <a:spcPts val="200"/>
+                        </a:spcAft>
+                        <a:buNone/>
+                      </a:pPr>
+                      <a:r>
+                        <a:rPr sz="1100">
+                          <a:solidFill>
+                            <a:srgbClr val="111111">
+                              <a:alpha val="100000"/>
+                            </a:srgbClr>
+                          </a:solidFill>
+                          <a:latin typeface="Arial"/>
+                          <a:cs typeface="Arial"/>
+                          <a:highlight>
+                            <a:srgbClr val="FFFFFF">
+                              <a:alpha val="0"/>
+                            </a:srgbClr>
+                          </a:highlight>
+                        </a:rPr>
+                        <a:t>Day of the Week</a:t>
+                      </a:r>
+                    </a:p>
+                  </a:txBody>
+                  <a:tcPr anchor="ctr" marB="0" marT="0" marR="0" marL="0">
+                    <a:lnL w="0" cmpd="sng" algn="ctr" cap="flat">
+                      <a:solidFill>
+                        <a:srgbClr val="FFFFFF">
+                          <a:alpha val="0"/>
+                        </a:srgbClr>
+                      </a:solidFill>
+                      <a:prstDash val="solid"/>
+                    </a:lnL>
+                    <a:lnR w="0" cmpd="sng" algn="ctr" cap="flat">
+                      <a:solidFill>
+                        <a:srgbClr val="FFFFFF">
+                          <a:alpha val="0"/>
+                        </a:srgbClr>
+                      </a:solidFill>
+                      <a:prstDash val="solid"/>
+                    </a:lnR>
+                    <a:lnT w="25400" cmpd="sng" algn="ctr" cap="flat">
+                      <a:solidFill>
+                        <a:srgbClr val="000000">
+                          <a:alpha val="100000"/>
+                        </a:srgbClr>
+                      </a:solidFill>
+                      <a:prstDash val="solid"/>
+                    </a:lnT>
+                    <a:lnB w="25400" cmpd="sng" algn="ctr" cap="flat">
+                      <a:solidFill>
+                        <a:srgbClr val="000000">
+                          <a:alpha val="100000"/>
+                        </a:srgbClr>
+                      </a:solidFill>
+                      <a:prstDash val="solid"/>
+                    </a:lnB>
+                  </a:tcPr>
+                </a:tc>
+                <a:tc>
+                  <a:txBody>
+                    <a:bodyPr/>
+                    <a:lstStyle/>
+                    <a:p>
+                      <a:pPr algn="r" marL="63500" marR="63500">
+                        <a:spcBef>
+                          <a:spcPts val="200"/>
+                        </a:spcBef>
+                        <a:spcAft>
+                          <a:spcPts val="200"/>
+                        </a:spcAft>
+                        <a:buNone/>
+                      </a:pPr>
+                      <a:r>
+                        <a:rPr sz="1100">
+                          <a:solidFill>
+                            <a:srgbClr val="111111">
+                              <a:alpha val="100000"/>
+                            </a:srgbClr>
+                          </a:solidFill>
+                          <a:latin typeface="Arial"/>
+                          <a:cs typeface="Arial"/>
+                          <a:highlight>
+                            <a:srgbClr val="FFFFFF">
+                              <a:alpha val="0"/>
+                            </a:srgbClr>
+                          </a:highlight>
+                        </a:rPr>
+                        <a:t>Number of Crimes</a:t>
+                      </a:r>
+                    </a:p>
+                  </a:txBody>
+                  <a:tcPr anchor="ctr" marB="0" marT="0" marR="0" marL="0">
+                    <a:lnL w="0" cmpd="sng" algn="ctr" cap="flat">
+                      <a:solidFill>
+                        <a:srgbClr val="FFFFFF">
+                          <a:alpha val="0"/>
+                        </a:srgbClr>
+                      </a:solidFill>
+                      <a:prstDash val="solid"/>
+                    </a:lnL>
+                    <a:lnR w="0" cmpd="sng" algn="ctr" cap="flat">
+                      <a:solidFill>
+                        <a:srgbClr val="FFFFFF">
+                          <a:alpha val="0"/>
+                        </a:srgbClr>
+                      </a:solidFill>
+                      <a:prstDash val="solid"/>
+                    </a:lnR>
+                    <a:lnT w="25400" cmpd="sng" algn="ctr" cap="flat">
+                      <a:solidFill>
+                        <a:srgbClr val="000000">
+                          <a:alpha val="100000"/>
+                        </a:srgbClr>
+                      </a:solidFill>
+                      <a:prstDash val="solid"/>
+                    </a:lnT>
+                    <a:lnB w="25400" cmpd="sng" algn="ctr" cap="flat">
+                      <a:solidFill>
+                        <a:srgbClr val="000000">
+                          <a:alpha val="100000"/>
+                        </a:srgbClr>
+                      </a:solidFill>
+                      <a:prstDash val="solid"/>
+                    </a:lnB>
+                  </a:tcPr>
+                </a:tc>
+              </a:tr>
+              <a:tr h="262758">
+                <a:tc>
+                  <a:txBody>
+                    <a:bodyPr/>
+                    <a:lstStyle/>
+                    <a:p>
+                      <a:pPr algn="l" marL="63500" marR="63500">
+                        <a:spcBef>
+                          <a:spcPts val="200"/>
+                        </a:spcBef>
+                        <a:spcAft>
+                          <a:spcPts val="200"/>
+                        </a:spcAft>
+                        <a:buNone/>
+                      </a:pPr>
+                      <a:r>
+                        <a:rPr sz="1100">
+                          <a:solidFill>
+                            <a:srgbClr val="111111">
+                              <a:alpha val="100000"/>
+                            </a:srgbClr>
+                          </a:solidFill>
+                          <a:latin typeface="Arial"/>
+                          <a:cs typeface="Arial"/>
+                          <a:highlight>
+                            <a:srgbClr val="FFFFFF">
+                              <a:alpha val="0"/>
+                            </a:srgbClr>
+                          </a:highlight>
+                        </a:rPr>
+                        <a:t>Sun</a:t>
+                      </a:r>
+                    </a:p>
+                  </a:txBody>
+                  <a:tcPr anchor="ctr" marB="0" marT="0" marR="0" marL="0">
+                    <a:lnL w="0" cmpd="sng" algn="ctr" cap="flat">
+                      <a:solidFill>
+                        <a:srgbClr val="FFFFFF">
+                          <a:alpha val="0"/>
+                        </a:srgbClr>
+                      </a:solidFill>
+                      <a:prstDash val="solid"/>
+                    </a:lnL>
+                    <a:lnR w="0" cmpd="sng" algn="ctr" cap="flat">
+                      <a:solidFill>
+                        <a:srgbClr val="FFFFFF">
+                          <a:alpha val="0"/>
+                        </a:srgbClr>
+                      </a:solidFill>
+                      <a:prstDash val="solid"/>
+                    </a:lnR>
+                    <a:lnT w="0" cmpd="sng" algn="ctr" cap="flat">
+                      <a:solidFill>
+                        <a:srgbClr val="FFFFFF">
+                          <a:alpha val="0"/>
+                        </a:srgbClr>
+                      </a:solidFill>
+                      <a:prstDash val="solid"/>
+                    </a:lnT>
+                    <a:lnB w="0" cmpd="sng" algn="ctr" cap="flat">
+                      <a:solidFill>
+                        <a:srgbClr val="FFFFFF">
+                          <a:alpha val="0"/>
+                        </a:srgbClr>
+                      </a:solidFill>
+                      <a:prstDash val="solid"/>
+                    </a:lnB>
+                  </a:tcPr>
+                </a:tc>
+                <a:tc>
+                  <a:txBody>
+                    <a:bodyPr/>
+                    <a:lstStyle/>
+                    <a:p>
+                      <a:pPr algn="r" marL="63500" marR="63500">
+                        <a:spcBef>
+                          <a:spcPts val="200"/>
+                        </a:spcBef>
+                        <a:spcAft>
+                          <a:spcPts val="200"/>
+                        </a:spcAft>
+                        <a:buNone/>
+                      </a:pPr>
+                      <a:r>
+                        <a:rPr sz="1100">
+                          <a:solidFill>
+                            <a:srgbClr val="111111">
+                              <a:alpha val="100000"/>
+                            </a:srgbClr>
+                          </a:solidFill>
+                          <a:latin typeface="Arial"/>
+                          <a:cs typeface="Arial"/>
+                          <a:highlight>
+                            <a:srgbClr val="FFFFFF">
+                              <a:alpha val="0"/>
+                            </a:srgbClr>
+                          </a:highlight>
+                        </a:rPr>
+                        <a:t>1</a:t>
+                      </a:r>
+                    </a:p>
+                  </a:txBody>
+                  <a:tcPr anchor="ctr" marB="0" marT="0" marR="0" marL="0">
+                    <a:lnL w="0" cmpd="sng" algn="ctr" cap="flat">
+                      <a:solidFill>
+                        <a:srgbClr val="FFFFFF">
+                          <a:alpha val="0"/>
+                        </a:srgbClr>
+                      </a:solidFill>
+                      <a:prstDash val="solid"/>
+                    </a:lnL>
+                    <a:lnR w="0" cmpd="sng" algn="ctr" cap="flat">
+                      <a:solidFill>
+                        <a:srgbClr val="FFFFFF">
+                          <a:alpha val="0"/>
+                        </a:srgbClr>
+                      </a:solidFill>
+                      <a:prstDash val="solid"/>
+                    </a:lnR>
+                    <a:lnT w="0" cmpd="sng" algn="ctr" cap="flat">
+                      <a:solidFill>
+                        <a:srgbClr val="FFFFFF">
+                          <a:alpha val="0"/>
+                        </a:srgbClr>
+                      </a:solidFill>
+                      <a:prstDash val="solid"/>
+                    </a:lnT>
+                    <a:lnB w="0" cmpd="sng" algn="ctr" cap="flat">
+                      <a:solidFill>
+                        <a:srgbClr val="FFFFFF">
+                          <a:alpha val="0"/>
+                        </a:srgbClr>
+                      </a:solidFill>
+                      <a:prstDash val="solid"/>
+                    </a:lnB>
+                  </a:tcPr>
+                </a:tc>
+              </a:tr>
+              <a:tr h="260773">
+                <a:tc>
+                  <a:txBody>
+                    <a:bodyPr/>
+                    <a:lstStyle/>
+                    <a:p>
+                      <a:pPr algn="l" marL="63500" marR="63500">
+                        <a:spcBef>
+                          <a:spcPts val="200"/>
+                        </a:spcBef>
+                        <a:spcAft>
+                          <a:spcPts val="200"/>
+                        </a:spcAft>
+                        <a:buNone/>
+                      </a:pPr>
+                      <a:r>
+                        <a:rPr sz="1100">
+                          <a:solidFill>
+                            <a:srgbClr val="111111">
+                              <a:alpha val="100000"/>
+                            </a:srgbClr>
+                          </a:solidFill>
+                          <a:latin typeface="Arial"/>
+                          <a:cs typeface="Arial"/>
+                          <a:highlight>
+                            <a:srgbClr val="FFFFFF">
+                              <a:alpha val="0"/>
+                            </a:srgbClr>
+                          </a:highlight>
+                        </a:rPr>
+                        <a:t>Mon</a:t>
+                      </a:r>
+                    </a:p>
+                  </a:txBody>
+                  <a:tcPr anchor="ctr" marB="0" marT="0" marR="0" marL="0">
+                    <a:lnL w="0" cmpd="sng" algn="ctr" cap="flat">
+                      <a:solidFill>
+                        <a:srgbClr val="FFFFFF">
+                          <a:alpha val="0"/>
+                        </a:srgbClr>
+                      </a:solidFill>
+                      <a:prstDash val="solid"/>
+                    </a:lnL>
+                    <a:lnR w="0" cmpd="sng" algn="ctr" cap="flat">
+                      <a:solidFill>
+                        <a:srgbClr val="FFFFFF">
+                          <a:alpha val="0"/>
+                        </a:srgbClr>
+                      </a:solidFill>
+                      <a:prstDash val="solid"/>
+                    </a:lnR>
+                    <a:lnT w="0" cmpd="sng" algn="ctr" cap="flat">
+                      <a:solidFill>
+                        <a:srgbClr val="FFFFFF">
+                          <a:alpha val="0"/>
+                        </a:srgbClr>
+                      </a:solidFill>
+                      <a:prstDash val="solid"/>
+                    </a:lnT>
+                    <a:lnB w="0" cmpd="sng" algn="ctr" cap="flat">
+                      <a:solidFill>
+                        <a:srgbClr val="FFFFFF">
+                          <a:alpha val="0"/>
+                        </a:srgbClr>
+                      </a:solidFill>
+                      <a:prstDash val="solid"/>
+                    </a:lnB>
+                  </a:tcPr>
+                </a:tc>
+                <a:tc>
+                  <a:txBody>
+                    <a:bodyPr/>
+                    <a:lstStyle/>
+                    <a:p>
+                      <a:pPr algn="r" marL="63500" marR="63500">
+                        <a:spcBef>
+                          <a:spcPts val="200"/>
+                        </a:spcBef>
+                        <a:spcAft>
+                          <a:spcPts val="200"/>
+                        </a:spcAft>
+                        <a:buNone/>
+                      </a:pPr>
+                      <a:r>
+                        <a:rPr sz="1100">
+                          <a:solidFill>
+                            <a:srgbClr val="111111">
+                              <a:alpha val="100000"/>
+                            </a:srgbClr>
+                          </a:solidFill>
+                          <a:latin typeface="Arial"/>
+                          <a:cs typeface="Arial"/>
+                          <a:highlight>
+                            <a:srgbClr val="FFFFFF">
+                              <a:alpha val="0"/>
+                            </a:srgbClr>
+                          </a:highlight>
+                        </a:rPr>
+                        <a:t>1</a:t>
+                      </a:r>
+                    </a:p>
+                  </a:txBody>
+                  <a:tcPr anchor="ctr" marB="0" marT="0" marR="0" marL="0">
+                    <a:lnL w="0" cmpd="sng" algn="ctr" cap="flat">
+                      <a:solidFill>
+                        <a:srgbClr val="FFFFFF">
+                          <a:alpha val="0"/>
+                        </a:srgbClr>
+                      </a:solidFill>
+                      <a:prstDash val="solid"/>
+                    </a:lnL>
+                    <a:lnR w="0" cmpd="sng" algn="ctr" cap="flat">
+                      <a:solidFill>
+                        <a:srgbClr val="FFFFFF">
+                          <a:alpha val="0"/>
+                        </a:srgbClr>
+                      </a:solidFill>
+                      <a:prstDash val="solid"/>
+                    </a:lnR>
+                    <a:lnT w="0" cmpd="sng" algn="ctr" cap="flat">
+                      <a:solidFill>
+                        <a:srgbClr val="FFFFFF">
+                          <a:alpha val="0"/>
+                        </a:srgbClr>
+                      </a:solidFill>
+                      <a:prstDash val="solid"/>
+                    </a:lnT>
+                    <a:lnB w="0" cmpd="sng" algn="ctr" cap="flat">
+                      <a:solidFill>
+                        <a:srgbClr val="FFFFFF">
+                          <a:alpha val="0"/>
+                        </a:srgbClr>
+                      </a:solidFill>
+                      <a:prstDash val="solid"/>
+                    </a:lnB>
+                  </a:tcPr>
+                </a:tc>
+              </a:tr>
+              <a:tr h="260773">
+                <a:tc>
+                  <a:txBody>
+                    <a:bodyPr/>
+                    <a:lstStyle/>
+                    <a:p>
+                      <a:pPr algn="l" marL="63500" marR="63500">
+                        <a:spcBef>
+                          <a:spcPts val="200"/>
+                        </a:spcBef>
+                        <a:spcAft>
+                          <a:spcPts val="200"/>
+                        </a:spcAft>
+                        <a:buNone/>
+                      </a:pPr>
+                      <a:r>
+                        <a:rPr sz="1100">
+                          <a:solidFill>
+                            <a:srgbClr val="111111">
+                              <a:alpha val="100000"/>
+                            </a:srgbClr>
+                          </a:solidFill>
+                          <a:latin typeface="Arial"/>
+                          <a:cs typeface="Arial"/>
+                          <a:highlight>
+                            <a:srgbClr val="FFFFFF">
+                              <a:alpha val="0"/>
+                            </a:srgbClr>
+                          </a:highlight>
+                        </a:rPr>
+                        <a:t>Tue</a:t>
+                      </a:r>
+                    </a:p>
+                  </a:txBody>
+                  <a:tcPr anchor="ctr" marB="0" marT="0" marR="0" marL="0">
+                    <a:lnL w="0" cmpd="sng" algn="ctr" cap="flat">
+                      <a:solidFill>
+                        <a:srgbClr val="FFFFFF">
+                          <a:alpha val="0"/>
+                        </a:srgbClr>
+                      </a:solidFill>
+                      <a:prstDash val="solid"/>
+                    </a:lnL>
+                    <a:lnR w="0" cmpd="sng" algn="ctr" cap="flat">
+                      <a:solidFill>
+                        <a:srgbClr val="FFFFFF">
+                          <a:alpha val="0"/>
+                        </a:srgbClr>
+                      </a:solidFill>
+                      <a:prstDash val="solid"/>
+                    </a:lnR>
+                    <a:lnT w="0" cmpd="sng" algn="ctr" cap="flat">
+                      <a:solidFill>
+                        <a:srgbClr val="FFFFFF">
+                          <a:alpha val="0"/>
+                        </a:srgbClr>
+                      </a:solidFill>
+                      <a:prstDash val="solid"/>
+                    </a:lnT>
+                    <a:lnB w="0" cmpd="sng" algn="ctr" cap="flat">
+                      <a:solidFill>
+                        <a:srgbClr val="FFFFFF">
+                          <a:alpha val="0"/>
+                        </a:srgbClr>
+                      </a:solidFill>
+                      <a:prstDash val="solid"/>
+                    </a:lnB>
+                  </a:tcPr>
+                </a:tc>
+                <a:tc>
+                  <a:txBody>
+                    <a:bodyPr/>
+                    <a:lstStyle/>
+                    <a:p>
+                      <a:pPr algn="r" marL="63500" marR="63500">
+                        <a:spcBef>
+                          <a:spcPts val="200"/>
+                        </a:spcBef>
+                        <a:spcAft>
+                          <a:spcPts val="200"/>
+                        </a:spcAft>
+                        <a:buNone/>
+                      </a:pPr>
+                      <a:r>
+                        <a:rPr sz="1100">
+                          <a:solidFill>
+                            <a:srgbClr val="111111">
+                              <a:alpha val="100000"/>
+                            </a:srgbClr>
+                          </a:solidFill>
+                          <a:latin typeface="Arial"/>
+                          <a:cs typeface="Arial"/>
+                          <a:highlight>
+                            <a:srgbClr val="FFFFFF">
+                              <a:alpha val="0"/>
+                            </a:srgbClr>
+                          </a:highlight>
+                        </a:rPr>
+                        <a:t>4</a:t>
+                      </a:r>
+                    </a:p>
+                  </a:txBody>
+                  <a:tcPr anchor="ctr" marB="0" marT="0" marR="0" marL="0">
+                    <a:lnL w="0" cmpd="sng" algn="ctr" cap="flat">
+                      <a:solidFill>
+                        <a:srgbClr val="FFFFFF">
+                          <a:alpha val="0"/>
+                        </a:srgbClr>
+                      </a:solidFill>
+                      <a:prstDash val="solid"/>
+                    </a:lnL>
+                    <a:lnR w="0" cmpd="sng" algn="ctr" cap="flat">
+                      <a:solidFill>
+                        <a:srgbClr val="FFFFFF">
+                          <a:alpha val="0"/>
+                        </a:srgbClr>
+                      </a:solidFill>
+                      <a:prstDash val="solid"/>
+                    </a:lnR>
+                    <a:lnT w="0" cmpd="sng" algn="ctr" cap="flat">
+                      <a:solidFill>
+                        <a:srgbClr val="FFFFFF">
+                          <a:alpha val="0"/>
+                        </a:srgbClr>
+                      </a:solidFill>
+                      <a:prstDash val="solid"/>
+                    </a:lnT>
+                    <a:lnB w="0" cmpd="sng" algn="ctr" cap="flat">
+                      <a:solidFill>
+                        <a:srgbClr val="FFFFFF">
+                          <a:alpha val="0"/>
+                        </a:srgbClr>
+                      </a:solidFill>
+                      <a:prstDash val="solid"/>
+                    </a:lnB>
+                  </a:tcPr>
+                </a:tc>
+              </a:tr>
+              <a:tr h="261369">
+                <a:tc>
+                  <a:txBody>
+                    <a:bodyPr/>
+                    <a:lstStyle/>
+                    <a:p>
+                      <a:pPr algn="l" marL="63500" marR="63500">
+                        <a:spcBef>
+                          <a:spcPts val="200"/>
+                        </a:spcBef>
+                        <a:spcAft>
+                          <a:spcPts val="200"/>
+                        </a:spcAft>
+                        <a:buNone/>
+                      </a:pPr>
+                      <a:r>
+                        <a:rPr sz="1100">
+                          <a:solidFill>
+                            <a:srgbClr val="111111">
+                              <a:alpha val="100000"/>
+                            </a:srgbClr>
+                          </a:solidFill>
+                          <a:latin typeface="Arial"/>
+                          <a:cs typeface="Arial"/>
+                          <a:highlight>
+                            <a:srgbClr val="FFFFFF">
+                              <a:alpha val="0"/>
+                            </a:srgbClr>
+                          </a:highlight>
+                        </a:rPr>
+                        <a:t>Wed</a:t>
+                      </a:r>
+                    </a:p>
+                  </a:txBody>
+                  <a:tcPr anchor="ctr" marB="0" marT="0" marR="0" marL="0">
+                    <a:lnL w="0" cmpd="sng" algn="ctr" cap="flat">
+                      <a:solidFill>
+                        <a:srgbClr val="FFFFFF">
+                          <a:alpha val="0"/>
+                        </a:srgbClr>
+                      </a:solidFill>
+                      <a:prstDash val="solid"/>
+                    </a:lnL>
+                    <a:lnR w="0" cmpd="sng" algn="ctr" cap="flat">
+                      <a:solidFill>
+                        <a:srgbClr val="FFFFFF">
+                          <a:alpha val="0"/>
+                        </a:srgbClr>
+                      </a:solidFill>
+                      <a:prstDash val="solid"/>
+                    </a:lnR>
+                    <a:lnT w="0" cmpd="sng" algn="ctr" cap="flat">
+                      <a:solidFill>
+                        <a:srgbClr val="FFFFFF">
+                          <a:alpha val="0"/>
+                        </a:srgbClr>
+                      </a:solidFill>
+                      <a:prstDash val="solid"/>
+                    </a:lnT>
+                    <a:lnB w="0" cmpd="sng" algn="ctr" cap="flat">
+                      <a:solidFill>
+                        <a:srgbClr val="FFFFFF">
+                          <a:alpha val="0"/>
+                        </a:srgbClr>
+                      </a:solidFill>
+                      <a:prstDash val="solid"/>
+                    </a:lnB>
+                  </a:tcPr>
+                </a:tc>
+                <a:tc>
+                  <a:txBody>
+                    <a:bodyPr/>
+                    <a:lstStyle/>
+                    <a:p>
+                      <a:pPr algn="r" marL="63500" marR="63500">
+                        <a:spcBef>
+                          <a:spcPts val="200"/>
+                        </a:spcBef>
+                        <a:spcAft>
+                          <a:spcPts val="200"/>
+                        </a:spcAft>
+                        <a:buNone/>
+                      </a:pPr>
+                      <a:r>
+                        <a:rPr sz="1100">
+                          <a:solidFill>
+                            <a:srgbClr val="111111">
+                              <a:alpha val="100000"/>
+                            </a:srgbClr>
+                          </a:solidFill>
+                          <a:latin typeface="Arial"/>
+                          <a:cs typeface="Arial"/>
+                          <a:highlight>
+                            <a:srgbClr val="FFFFFF">
+                              <a:alpha val="0"/>
+                            </a:srgbClr>
+                          </a:highlight>
+                        </a:rPr>
+                        <a:t>3</a:t>
+                      </a:r>
+                    </a:p>
+                  </a:txBody>
+                  <a:tcPr anchor="ctr" marB="0" marT="0" marR="0" marL="0">
+                    <a:lnL w="0" cmpd="sng" algn="ctr" cap="flat">
+                      <a:solidFill>
+                        <a:srgbClr val="FFFFFF">
+                          <a:alpha val="0"/>
+                        </a:srgbClr>
+                      </a:solidFill>
+                      <a:prstDash val="solid"/>
+                    </a:lnL>
+                    <a:lnR w="0" cmpd="sng" algn="ctr" cap="flat">
+                      <a:solidFill>
+                        <a:srgbClr val="FFFFFF">
+                          <a:alpha val="0"/>
+                        </a:srgbClr>
+                      </a:solidFill>
+                      <a:prstDash val="solid"/>
+                    </a:lnR>
+                    <a:lnT w="0" cmpd="sng" algn="ctr" cap="flat">
+                      <a:solidFill>
+                        <a:srgbClr val="FFFFFF">
+                          <a:alpha val="0"/>
+                        </a:srgbClr>
+                      </a:solidFill>
+                      <a:prstDash val="solid"/>
+                    </a:lnT>
+                    <a:lnB w="0" cmpd="sng" algn="ctr" cap="flat">
+                      <a:solidFill>
+                        <a:srgbClr val="FFFFFF">
+                          <a:alpha val="0"/>
+                        </a:srgbClr>
+                      </a:solidFill>
+                      <a:prstDash val="solid"/>
+                    </a:lnB>
+                  </a:tcPr>
+                </a:tc>
+              </a:tr>
+              <a:tr h="261369">
+                <a:tc>
+                  <a:txBody>
+                    <a:bodyPr/>
+                    <a:lstStyle/>
+                    <a:p>
+                      <a:pPr algn="l" marL="63500" marR="63500">
+                        <a:spcBef>
+                          <a:spcPts val="200"/>
+                        </a:spcBef>
+                        <a:spcAft>
+                          <a:spcPts val="200"/>
+                        </a:spcAft>
+                        <a:buNone/>
+                      </a:pPr>
+                      <a:r>
+                        <a:rPr sz="1100">
+                          <a:solidFill>
+                            <a:srgbClr val="111111">
+                              <a:alpha val="100000"/>
+                            </a:srgbClr>
+                          </a:solidFill>
+                          <a:latin typeface="Arial"/>
+                          <a:cs typeface="Arial"/>
+                          <a:highlight>
+                            <a:srgbClr val="FFFFFF">
+                              <a:alpha val="0"/>
+                            </a:srgbClr>
+                          </a:highlight>
+                        </a:rPr>
+                        <a:t>Thu</a:t>
+                      </a:r>
+                    </a:p>
+                  </a:txBody>
+                  <a:tcPr anchor="ctr" marB="0" marT="0" marR="0" marL="0">
+                    <a:lnL w="0" cmpd="sng" algn="ctr" cap="flat">
+                      <a:solidFill>
+                        <a:srgbClr val="FFFFFF">
+                          <a:alpha val="0"/>
+                        </a:srgbClr>
+                      </a:solidFill>
+                      <a:prstDash val="solid"/>
+                    </a:lnL>
+                    <a:lnR w="0" cmpd="sng" algn="ctr" cap="flat">
+                      <a:solidFill>
+                        <a:srgbClr val="FFFFFF">
+                          <a:alpha val="0"/>
+                        </a:srgbClr>
+                      </a:solidFill>
+                      <a:prstDash val="solid"/>
+                    </a:lnR>
+                    <a:lnT w="0" cmpd="sng" algn="ctr" cap="flat">
+                      <a:solidFill>
+                        <a:srgbClr val="FFFFFF">
+                          <a:alpha val="0"/>
+                        </a:srgbClr>
+                      </a:solidFill>
+                      <a:prstDash val="solid"/>
+                    </a:lnT>
+                    <a:lnB w="0" cmpd="sng" algn="ctr" cap="flat">
+                      <a:solidFill>
+                        <a:srgbClr val="FFFFFF">
+                          <a:alpha val="0"/>
+                        </a:srgbClr>
+                      </a:solidFill>
+                      <a:prstDash val="solid"/>
+                    </a:lnB>
+                  </a:tcPr>
+                </a:tc>
+                <a:tc>
+                  <a:txBody>
+                    <a:bodyPr/>
+                    <a:lstStyle/>
+                    <a:p>
+                      <a:pPr algn="r" marL="63500" marR="63500">
+                        <a:spcBef>
+                          <a:spcPts val="200"/>
+                        </a:spcBef>
+                        <a:spcAft>
+                          <a:spcPts val="200"/>
+                        </a:spcAft>
+                        <a:buNone/>
+                      </a:pPr>
+                      <a:r>
+                        <a:rPr sz="1100">
+                          <a:solidFill>
+                            <a:srgbClr val="111111">
+                              <a:alpha val="100000"/>
+                            </a:srgbClr>
+                          </a:solidFill>
+                          <a:latin typeface="Arial"/>
+                          <a:cs typeface="Arial"/>
+                          <a:highlight>
+                            <a:srgbClr val="FFFFFF">
+                              <a:alpha val="0"/>
+                            </a:srgbClr>
+                          </a:highlight>
+                        </a:rPr>
+                        <a:t>6</a:t>
+                      </a:r>
+                    </a:p>
+                  </a:txBody>
+                  <a:tcPr anchor="ctr" marB="0" marT="0" marR="0" marL="0">
+                    <a:lnL w="0" cmpd="sng" algn="ctr" cap="flat">
+                      <a:solidFill>
+                        <a:srgbClr val="FFFFFF">
+                          <a:alpha val="0"/>
+                        </a:srgbClr>
+                      </a:solidFill>
+                      <a:prstDash val="solid"/>
+                    </a:lnL>
+                    <a:lnR w="0" cmpd="sng" algn="ctr" cap="flat">
+                      <a:solidFill>
+                        <a:srgbClr val="FFFFFF">
+                          <a:alpha val="0"/>
+                        </a:srgbClr>
+                      </a:solidFill>
+                      <a:prstDash val="solid"/>
+                    </a:lnR>
+                    <a:lnT w="0" cmpd="sng" algn="ctr" cap="flat">
+                      <a:solidFill>
+                        <a:srgbClr val="FFFFFF">
+                          <a:alpha val="0"/>
+                        </a:srgbClr>
+                      </a:solidFill>
+                      <a:prstDash val="solid"/>
+                    </a:lnT>
+                    <a:lnB w="0" cmpd="sng" algn="ctr" cap="flat">
+                      <a:solidFill>
+                        <a:srgbClr val="FFFFFF">
+                          <a:alpha val="0"/>
+                        </a:srgbClr>
+                      </a:solidFill>
+                      <a:prstDash val="solid"/>
+                    </a:lnB>
+                  </a:tcPr>
+                </a:tc>
+              </a:tr>
+              <a:tr h="259583">
+                <a:tc>
+                  <a:txBody>
+                    <a:bodyPr/>
+                    <a:lstStyle/>
+                    <a:p>
+                      <a:pPr algn="l" marL="63500" marR="63500">
+                        <a:spcBef>
+                          <a:spcPts val="200"/>
+                        </a:spcBef>
+                        <a:spcAft>
+                          <a:spcPts val="200"/>
+                        </a:spcAft>
+                        <a:buNone/>
+                      </a:pPr>
+                      <a:r>
+                        <a:rPr sz="1100">
+                          <a:solidFill>
+                            <a:srgbClr val="111111">
+                              <a:alpha val="100000"/>
+                            </a:srgbClr>
+                          </a:solidFill>
+                          <a:latin typeface="Arial"/>
+                          <a:cs typeface="Arial"/>
+                          <a:highlight>
+                            <a:srgbClr val="FFFFFF">
+                              <a:alpha val="0"/>
+                            </a:srgbClr>
+                          </a:highlight>
+                        </a:rPr>
+                        <a:t>Fri</a:t>
+                      </a:r>
+                    </a:p>
+                  </a:txBody>
+                  <a:tcPr anchor="ctr" marB="0" marT="0" marR="0" marL="0">
+                    <a:lnL w="0" cmpd="sng" algn="ctr" cap="flat">
+                      <a:solidFill>
+                        <a:srgbClr val="FFFFFF">
+                          <a:alpha val="0"/>
+                        </a:srgbClr>
+                      </a:solidFill>
+                      <a:prstDash val="solid"/>
+                    </a:lnL>
+                    <a:lnR w="0" cmpd="sng" algn="ctr" cap="flat">
+                      <a:solidFill>
+                        <a:srgbClr val="FFFFFF">
+                          <a:alpha val="0"/>
+                        </a:srgbClr>
+                      </a:solidFill>
+                      <a:prstDash val="solid"/>
+                    </a:lnR>
+                    <a:lnT w="0" cmpd="sng" algn="ctr" cap="flat">
+                      <a:solidFill>
+                        <a:srgbClr val="FFFFFF">
+                          <a:alpha val="0"/>
+                        </a:srgbClr>
+                      </a:solidFill>
+                      <a:prstDash val="solid"/>
+                    </a:lnT>
+                    <a:lnB w="0" cmpd="sng" algn="ctr" cap="flat">
+                      <a:solidFill>
+                        <a:srgbClr val="FFFFFF">
+                          <a:alpha val="0"/>
+                        </a:srgbClr>
+                      </a:solidFill>
+                      <a:prstDash val="solid"/>
+                    </a:lnB>
+                  </a:tcPr>
+                </a:tc>
+                <a:tc>
+                  <a:txBody>
+                    <a:bodyPr/>
+                    <a:lstStyle/>
+                    <a:p>
+                      <a:pPr algn="r" marL="63500" marR="63500">
+                        <a:spcBef>
+                          <a:spcPts val="200"/>
+                        </a:spcBef>
+                        <a:spcAft>
+                          <a:spcPts val="200"/>
+                        </a:spcAft>
+                        <a:buNone/>
+                      </a:pPr>
+                      <a:r>
+                        <a:rPr sz="1100">
+                          <a:solidFill>
+                            <a:srgbClr val="111111">
+                              <a:alpha val="100000"/>
+                            </a:srgbClr>
+                          </a:solidFill>
+                          <a:latin typeface="Arial"/>
+                          <a:cs typeface="Arial"/>
+                          <a:highlight>
+                            <a:srgbClr val="FFFFFF">
+                              <a:alpha val="0"/>
+                            </a:srgbClr>
+                          </a:highlight>
+                        </a:rPr>
+                        <a:t>2</a:t>
+                      </a:r>
+                    </a:p>
+                  </a:txBody>
+                  <a:tcPr anchor="ctr" marB="0" marT="0" marR="0" marL="0">
+                    <a:lnL w="0" cmpd="sng" algn="ctr" cap="flat">
+                      <a:solidFill>
+                        <a:srgbClr val="FFFFFF">
+                          <a:alpha val="0"/>
+                        </a:srgbClr>
+                      </a:solidFill>
+                      <a:prstDash val="solid"/>
+                    </a:lnL>
+                    <a:lnR w="0" cmpd="sng" algn="ctr" cap="flat">
+                      <a:solidFill>
+                        <a:srgbClr val="FFFFFF">
+                          <a:alpha val="0"/>
+                        </a:srgbClr>
+                      </a:solidFill>
+                      <a:prstDash val="solid"/>
+                    </a:lnR>
+                    <a:lnT w="0" cmpd="sng" algn="ctr" cap="flat">
+                      <a:solidFill>
+                        <a:srgbClr val="FFFFFF">
+                          <a:alpha val="0"/>
+                        </a:srgbClr>
+                      </a:solidFill>
+                      <a:prstDash val="solid"/>
+                    </a:lnT>
+                    <a:lnB w="0" cmpd="sng" algn="ctr" cap="flat">
+                      <a:solidFill>
+                        <a:srgbClr val="FFFFFF">
+                          <a:alpha val="0"/>
+                        </a:srgbClr>
+                      </a:solidFill>
+                      <a:prstDash val="solid"/>
+                    </a:lnB>
+                  </a:tcPr>
+                </a:tc>
+              </a:tr>
+              <a:tr h="262758">
+                <a:tc>
+                  <a:txBody>
+                    <a:bodyPr/>
+                    <a:lstStyle/>
+                    <a:p>
+                      <a:pPr algn="l" marL="63500" marR="63500">
+                        <a:spcBef>
+                          <a:spcPts val="200"/>
+                        </a:spcBef>
+                        <a:spcAft>
+                          <a:spcPts val="200"/>
+                        </a:spcAft>
+                        <a:buNone/>
+                      </a:pPr>
+                      <a:r>
+                        <a:rPr sz="1100">
+                          <a:solidFill>
+                            <a:srgbClr val="111111">
+                              <a:alpha val="100000"/>
+                            </a:srgbClr>
+                          </a:solidFill>
+                          <a:latin typeface="Arial"/>
+                          <a:cs typeface="Arial"/>
+                          <a:highlight>
+                            <a:srgbClr val="FFFFFF">
+                              <a:alpha val="0"/>
+                            </a:srgbClr>
+                          </a:highlight>
+                        </a:rPr>
+                        <a:t>Sat</a:t>
+                      </a:r>
+                    </a:p>
+                  </a:txBody>
+                  <a:tcPr anchor="ctr" marB="0" marT="0" marR="0" marL="0">
+                    <a:lnL w="0" cmpd="sng" algn="ctr" cap="flat">
+                      <a:solidFill>
+                        <a:srgbClr val="FFFFFF">
+                          <a:alpha val="0"/>
+                        </a:srgbClr>
+                      </a:solidFill>
+                      <a:prstDash val="solid"/>
+                    </a:lnL>
+                    <a:lnR w="0" cmpd="sng" algn="ctr" cap="flat">
+                      <a:solidFill>
+                        <a:srgbClr val="FFFFFF">
+                          <a:alpha val="0"/>
+                        </a:srgbClr>
+                      </a:solidFill>
+                      <a:prstDash val="solid"/>
+                    </a:lnR>
+                    <a:lnT w="0" cmpd="sng" algn="ctr" cap="flat">
+                      <a:solidFill>
+                        <a:srgbClr val="FFFFFF">
+                          <a:alpha val="0"/>
+                        </a:srgbClr>
+                      </a:solidFill>
+                      <a:prstDash val="solid"/>
+                    </a:lnT>
+                    <a:lnB w="0" cmpd="sng" algn="ctr" cap="flat">
+                      <a:solidFill>
+                        <a:srgbClr val="FFFFFF">
+                          <a:alpha val="0"/>
+                        </a:srgbClr>
+                      </a:solidFill>
+                      <a:prstDash val="solid"/>
+                    </a:lnB>
+                  </a:tcPr>
+                </a:tc>
+                <a:tc>
+                  <a:txBody>
+                    <a:bodyPr/>
+                    <a:lstStyle/>
+                    <a:p>
+                      <a:pPr algn="r" marL="63500" marR="63500">
+                        <a:spcBef>
+                          <a:spcPts val="200"/>
+                        </a:spcBef>
+                        <a:spcAft>
+                          <a:spcPts val="200"/>
+                        </a:spcAft>
+                        <a:buNone/>
+                      </a:pPr>
+                      <a:r>
+                        <a:rPr sz="1100">
+                          <a:solidFill>
+                            <a:srgbClr val="111111">
+                              <a:alpha val="100000"/>
+                            </a:srgbClr>
+                          </a:solidFill>
+                          <a:latin typeface="Arial"/>
+                          <a:cs typeface="Arial"/>
+                          <a:highlight>
+                            <a:srgbClr val="FFFFFF">
+                              <a:alpha val="0"/>
+                            </a:srgbClr>
+                          </a:highlight>
+                        </a:rPr>
+                        <a:t>3</a:t>
+                      </a:r>
+                    </a:p>
+                  </a:txBody>
+                  <a:tcPr anchor="ctr" marB="0" marT="0" marR="0" marL="0">
+                    <a:lnL w="0" cmpd="sng" algn="ctr" cap="flat">
+                      <a:solidFill>
+                        <a:srgbClr val="FFFFFF">
+                          <a:alpha val="0"/>
+                        </a:srgbClr>
+                      </a:solidFill>
+                      <a:prstDash val="solid"/>
+                    </a:lnL>
+                    <a:lnR w="0" cmpd="sng" algn="ctr" cap="flat">
+                      <a:solidFill>
+                        <a:srgbClr val="FFFFFF">
+                          <a:alpha val="0"/>
+                        </a:srgbClr>
+                      </a:solidFill>
+                      <a:prstDash val="solid"/>
+                    </a:lnR>
+                    <a:lnT w="0" cmpd="sng" algn="ctr" cap="flat">
+                      <a:solidFill>
+                        <a:srgbClr val="FFFFFF">
+                          <a:alpha val="0"/>
+                        </a:srgbClr>
+                      </a:solidFill>
+                      <a:prstDash val="solid"/>
+                    </a:lnT>
+                    <a:lnB w="0" cmpd="sng" algn="ctr" cap="flat">
+                      <a:solidFill>
+                        <a:srgbClr val="FFFFFF">
+                          <a:alpha val="0"/>
+                        </a:srgbClr>
+                      </a:solidFill>
+                      <a:prstDash val="solid"/>
+                    </a:lnB>
+                  </a:tcPr>
+                </a:tc>
+              </a:tr>
+              <a:tr h="261369">
+                <a:tc>
+                  <a:txBody>
+                    <a:bodyPr/>
+                    <a:lstStyle/>
+                    <a:p>
+                      <a:pPr algn="l" marL="63500" marR="63500">
+                        <a:spcBef>
+                          <a:spcPts val="200"/>
+                        </a:spcBef>
+                        <a:spcAft>
+                          <a:spcPts val="200"/>
+                        </a:spcAft>
+                        <a:buNone/>
+                      </a:pPr>
+                      <a:r>
+                        <a:rPr sz="1100">
+                          <a:solidFill>
+                            <a:srgbClr val="111111">
+                              <a:alpha val="100000"/>
+                            </a:srgbClr>
+                          </a:solidFill>
+                          <a:latin typeface="Arial"/>
+                          <a:cs typeface="Arial"/>
+                          <a:highlight>
+                            <a:srgbClr val="FFFFFF">
+                              <a:alpha val="0"/>
+                            </a:srgbClr>
+                          </a:highlight>
+                        </a:rPr>
+                        <a:t>Total</a:t>
+                      </a:r>
+                    </a:p>
+                  </a:txBody>
+                  <a:tcPr anchor="ctr" marB="0" marT="0" marR="0" marL="0">
+                    <a:lnL w="0" cmpd="sng" algn="ctr" cap="flat">
+                      <a:solidFill>
+                        <a:srgbClr val="FFFFFF">
+                          <a:alpha val="0"/>
+                        </a:srgbClr>
+                      </a:solidFill>
+                      <a:prstDash val="solid"/>
+                    </a:lnL>
+                    <a:lnR w="0" cmpd="sng" algn="ctr" cap="flat">
+                      <a:solidFill>
+                        <a:srgbClr val="FFFFFF">
+                          <a:alpha val="0"/>
+                        </a:srgbClr>
+                      </a:solidFill>
+                      <a:prstDash val="solid"/>
+                    </a:lnR>
+                    <a:lnT w="0" cmpd="sng" algn="ctr" cap="flat">
+                      <a:solidFill>
+                        <a:srgbClr val="FFFFFF">
+                          <a:alpha val="0"/>
+                        </a:srgbClr>
+                      </a:solidFill>
+                      <a:prstDash val="solid"/>
+                    </a:lnT>
+                    <a:lnB w="25400" cmpd="sng" algn="ctr" cap="flat">
+                      <a:solidFill>
+                        <a:srgbClr val="000000">
+                          <a:alpha val="100000"/>
+                        </a:srgbClr>
+                      </a:solidFill>
+                      <a:prstDash val="solid"/>
+                    </a:lnB>
+                  </a:tcPr>
+                </a:tc>
+                <a:tc>
+                  <a:txBody>
+                    <a:bodyPr/>
+                    <a:lstStyle/>
+                    <a:p>
+                      <a:pPr algn="r" marL="63500" marR="63500">
+                        <a:spcBef>
+                          <a:spcPts val="200"/>
+                        </a:spcBef>
+                        <a:spcAft>
+                          <a:spcPts val="200"/>
+                        </a:spcAft>
+                        <a:buNone/>
+                      </a:pPr>
+                      <a:r>
+                        <a:rPr sz="1100">
+                          <a:solidFill>
+                            <a:srgbClr val="111111">
+                              <a:alpha val="100000"/>
+                            </a:srgbClr>
+                          </a:solidFill>
+                          <a:latin typeface="Arial"/>
+                          <a:cs typeface="Arial"/>
+                          <a:highlight>
+                            <a:srgbClr val="FFFFFF">
+                              <a:alpha val="0"/>
+                            </a:srgbClr>
+                          </a:highlight>
+                        </a:rPr>
+                        <a:t>20</a:t>
+                      </a:r>
+                    </a:p>
+                  </a:txBody>
+                  <a:tcPr anchor="ctr" marB="0" marT="0" marR="0" marL="0">
+                    <a:lnL w="0" cmpd="sng" algn="ctr" cap="flat">
+                      <a:solidFill>
+                        <a:srgbClr val="FFFFFF">
+                          <a:alpha val="0"/>
+                        </a:srgbClr>
+                      </a:solidFill>
+                      <a:prstDash val="solid"/>
+                    </a:lnL>
+                    <a:lnR w="0" cmpd="sng" algn="ctr" cap="flat">
+                      <a:solidFill>
+                        <a:srgbClr val="FFFFFF">
+                          <a:alpha val="0"/>
+                        </a:srgbClr>
+                      </a:solidFill>
+                      <a:prstDash val="solid"/>
+                    </a:lnR>
+                    <a:lnT w="0" cmpd="sng" algn="ctr" cap="flat">
+                      <a:solidFill>
+                        <a:srgbClr val="FFFFFF">
+                          <a:alpha val="0"/>
+                        </a:srgbClr>
+                      </a:solidFill>
+                      <a:prstDash val="solid"/>
+                    </a:lnT>
+                    <a:lnB w="25400" cmpd="sng" algn="ctr" cap="flat">
+                      <a:solidFill>
+                        <a:srgbClr val="000000">
+                          <a:alpha val="100000"/>
+                        </a:srgbClr>
+                      </a:solidFill>
+                      <a:prstDash val="solid"/>
+                    </a:lnB>
+                  </a:tcPr>
+                </a:tc>
+              </a:tr>
+            </a:tbl>
+          </a:graphicData>
+        </a:graphic>
+      </p:graphicFrame>
+      <p:sp>
+        <p:nvSpPr>
+          <p:cNvPr id="3" name="Content Placeholder 2"/>
+          <p:cNvSpPr>
+            <a:spLocks noGrp="1"/>
+          </p:cNvSpPr>
+          <p:nvPr>
+            <p:ph idx="1"/>
+          </p:nvPr>
+        </p:nvSpPr>
+        <p:spPr/>
+        <p:txBody>
+          <a:bodyPr/>
+          <a:lstStyle/>
+          <a:p>
+            <a:pPr lvl="0" marL="1270000" indent="0">
+              <a:buNone/>
+            </a:pPr>
+            <a:r>
+              <a:rPr sz="1800" b="1">
+                <a:solidFill>
+                  <a:srgbClr val="007020"/>
+                </a:solidFill>
+                <a:latin typeface="Courier"/>
+              </a:rPr>
+              <a:t>flextable</a:t>
+            </a:r>
+            <a:r>
+              <a:rPr sz="1800">
+                <a:latin typeface="Courier"/>
+              </a:rPr>
+              <a:t>(fpse_violent) </a:t>
+            </a:r>
+            <a:r>
+              <a:rPr sz="1800">
+                <a:solidFill>
+                  <a:srgbClr val="666666"/>
+                </a:solidFill>
+                <a:latin typeface="Courier"/>
+              </a:rPr>
+              <a:t>%&gt;%</a:t>
+            </a:r>
+            <a:r>
+              <a:rPr sz="1800">
+                <a:solidFill>
+                  <a:srgbClr val="4070A0"/>
+                </a:solidFill>
+                <a:latin typeface="Courier"/>
+              </a:rPr>
+              <a:t> </a:t>
+            </a:r>
+            <a:br/>
+            <a:br/>
+            <a:r>
+              <a:rPr sz="1800">
+                <a:solidFill>
+                  <a:srgbClr val="4070A0"/>
+                </a:solidFill>
+                <a:latin typeface="Courier"/>
+              </a:rPr>
+              <a:t>  </a:t>
+            </a:r>
+            <a:r>
+              <a:rPr sz="1800" b="1">
+                <a:solidFill>
+                  <a:srgbClr val="007020"/>
+                </a:solidFill>
+                <a:latin typeface="Courier"/>
+              </a:rPr>
+              <a:t>autofit</a:t>
+            </a:r>
+            <a:r>
+              <a:rPr sz="1800">
+                <a:latin typeface="Courier"/>
+              </a:rPr>
+              <a:t>()</a:t>
+            </a:r>
+          </a:p>
+        </p:txBody>
+      </p:sp>
+      <p:graphicFrame xmlns:a="http://schemas.openxmlformats.org/drawingml/2006/main" xmlns:r="http://schemas.openxmlformats.org/officeDocument/2006/relationships" xmlns:p="http://schemas.openxmlformats.org/presentationml/2006/main">
+        <p:nvGraphicFramePr>
+          <p:cNvPr id="351816683" name=""/>
+          <p:cNvGraphicFramePr>
+            <a:graphicFrameLocks noGrp="true"/>
+          </p:cNvGraphicFramePr>
+          <p:nvPr/>
+        </p:nvGraphicFramePr>
+        <p:xfrm rot="0">
+          <a:off x="914400" y="1828800"/>
+          <a:ext cx="9144000" cy="5486400"/>
+        </p:xfrm>
+        <a:graphic>
+          <a:graphicData uri="http://schemas.openxmlformats.org/drawingml/2006/table">
+            <a:tbl>
+              <a:tblPr/>
+              <a:tblGrid>
+                <a:gridCol w="1759206"/>
+                <a:gridCol w="1394131"/>
+              </a:tblGrid>
+              <a:tr h="290341">
+                <a:tc>
+                  <a:txBody>
+                    <a:bodyPr/>
+                    <a:lstStyle/>
+                    <a:p>
+                      <a:pPr algn="l" marL="63500" marR="63500">
+                        <a:spcBef>
+                          <a:spcPts val="200"/>
+                        </a:spcBef>
+                        <a:spcAft>
+                          <a:spcPts val="200"/>
+                        </a:spcAft>
+                        <a:buNone/>
+                      </a:pPr>
+                      <a:r>
+                        <a:rPr sz="1100">
+                          <a:solidFill>
+                            <a:srgbClr val="111111">
+                              <a:alpha val="100000"/>
+                            </a:srgbClr>
+                          </a:solidFill>
+                          <a:latin typeface="Arial"/>
+                          <a:cs typeface="Arial"/>
+                          <a:highlight>
+                            <a:srgbClr val="FFFFFF">
+                              <a:alpha val="0"/>
+                            </a:srgbClr>
+                          </a:highlight>
+                        </a:rPr>
+                        <a:t>Crimes Against Persons</a:t>
+                      </a:r>
+                    </a:p>
+                  </a:txBody>
+                  <a:tcPr anchor="ctr" marB="0" marT="0" marR="0" marL="0">
+                    <a:lnL w="0" cmpd="sng" algn="ctr" cap="flat">
+                      <a:solidFill>
+                        <a:srgbClr val="FFFFFF">
+                          <a:alpha val="0"/>
+                        </a:srgbClr>
+                      </a:solidFill>
+                      <a:prstDash val="solid"/>
+                    </a:lnL>
+                    <a:lnR w="0" cmpd="sng" algn="ctr" cap="flat">
+                      <a:solidFill>
+                        <a:srgbClr val="FFFFFF">
+                          <a:alpha val="0"/>
+                        </a:srgbClr>
+                      </a:solidFill>
+                      <a:prstDash val="solid"/>
+                    </a:lnR>
+                    <a:lnT w="25400" cmpd="sng" algn="ctr" cap="flat">
+                      <a:solidFill>
+                        <a:srgbClr val="000000">
+                          <a:alpha val="100000"/>
+                        </a:srgbClr>
+                      </a:solidFill>
+                      <a:prstDash val="solid"/>
+                    </a:lnT>
+                    <a:lnB w="25400" cmpd="sng" algn="ctr" cap="flat">
+                      <a:solidFill>
+                        <a:srgbClr val="000000">
+                          <a:alpha val="100000"/>
+                        </a:srgbClr>
+                      </a:solidFill>
+                      <a:prstDash val="solid"/>
+                    </a:lnB>
+                  </a:tcPr>
+                </a:tc>
+                <a:tc>
+                  <a:txBody>
+                    <a:bodyPr/>
+                    <a:lstStyle/>
+                    <a:p>
+                      <a:pPr algn="r" marL="63500" marR="63500">
+                        <a:spcBef>
+                          <a:spcPts val="200"/>
+                        </a:spcBef>
+                        <a:spcAft>
+                          <a:spcPts val="200"/>
+                        </a:spcAft>
+                        <a:buNone/>
+                      </a:pPr>
+                      <a:r>
+                        <a:rPr sz="1100">
+                          <a:solidFill>
+                            <a:srgbClr val="111111">
+                              <a:alpha val="100000"/>
+                            </a:srgbClr>
+                          </a:solidFill>
+                          <a:latin typeface="Arial"/>
+                          <a:cs typeface="Arial"/>
+                          <a:highlight>
+                            <a:srgbClr val="FFFFFF">
+                              <a:alpha val="0"/>
+                            </a:srgbClr>
+                          </a:highlight>
+                        </a:rPr>
+                        <a:t>Number of Crimes</a:t>
+                      </a:r>
+                    </a:p>
+                  </a:txBody>
+                  <a:tcPr anchor="ctr" marB="0" marT="0" marR="0" marL="0">
+                    <a:lnL w="0" cmpd="sng" algn="ctr" cap="flat">
+                      <a:solidFill>
+                        <a:srgbClr val="FFFFFF">
+                          <a:alpha val="0"/>
+                        </a:srgbClr>
+                      </a:solidFill>
+                      <a:prstDash val="solid"/>
+                    </a:lnL>
+                    <a:lnR w="0" cmpd="sng" algn="ctr" cap="flat">
+                      <a:solidFill>
+                        <a:srgbClr val="FFFFFF">
+                          <a:alpha val="0"/>
+                        </a:srgbClr>
+                      </a:solidFill>
+                      <a:prstDash val="solid"/>
+                    </a:lnR>
+                    <a:lnT w="25400" cmpd="sng" algn="ctr" cap="flat">
+                      <a:solidFill>
+                        <a:srgbClr val="000000">
+                          <a:alpha val="100000"/>
+                        </a:srgbClr>
+                      </a:solidFill>
+                      <a:prstDash val="solid"/>
+                    </a:lnT>
+                    <a:lnB w="25400" cmpd="sng" algn="ctr" cap="flat">
+                      <a:solidFill>
+                        <a:srgbClr val="000000">
+                          <a:alpha val="100000"/>
+                        </a:srgbClr>
+                      </a:solidFill>
+                      <a:prstDash val="solid"/>
+                    </a:lnB>
+                  </a:tcPr>
+                </a:tc>
+              </a:tr>
+              <a:tr h="262758">
+                <a:tc>
+                  <a:txBody>
+                    <a:bodyPr/>
+                    <a:lstStyle/>
+                    <a:p>
+                      <a:pPr algn="l" marL="63500" marR="63500">
+                        <a:spcBef>
+                          <a:spcPts val="200"/>
+                        </a:spcBef>
+                        <a:spcAft>
+                          <a:spcPts val="200"/>
+                        </a:spcAft>
+                        <a:buNone/>
+                      </a:pPr>
+                      <a:r>
+                        <a:rPr sz="1100">
+                          <a:solidFill>
+                            <a:srgbClr val="111111">
+                              <a:alpha val="100000"/>
+                            </a:srgbClr>
+                          </a:solidFill>
+                          <a:latin typeface="Arial"/>
+                          <a:cs typeface="Arial"/>
+                          <a:highlight>
+                            <a:srgbClr val="FFFFFF">
+                              <a:alpha val="0"/>
+                            </a:srgbClr>
+                          </a:highlight>
+                        </a:rPr>
+                        <a:t>FALSE</a:t>
+                      </a:r>
+                    </a:p>
+                  </a:txBody>
+                  <a:tcPr anchor="ctr" marB="0" marT="0" marR="0" marL="0">
+                    <a:lnL w="0" cmpd="sng" algn="ctr" cap="flat">
+                      <a:solidFill>
+                        <a:srgbClr val="FFFFFF">
+                          <a:alpha val="0"/>
+                        </a:srgbClr>
+                      </a:solidFill>
+                      <a:prstDash val="solid"/>
+                    </a:lnL>
+                    <a:lnR w="0" cmpd="sng" algn="ctr" cap="flat">
+                      <a:solidFill>
+                        <a:srgbClr val="FFFFFF">
+                          <a:alpha val="0"/>
+                        </a:srgbClr>
+                      </a:solidFill>
+                      <a:prstDash val="solid"/>
+                    </a:lnR>
+                    <a:lnT w="0" cmpd="sng" algn="ctr" cap="flat">
+                      <a:solidFill>
+                        <a:srgbClr val="FFFFFF">
+                          <a:alpha val="0"/>
+                        </a:srgbClr>
+                      </a:solidFill>
+                      <a:prstDash val="solid"/>
+                    </a:lnT>
+                    <a:lnB w="0" cmpd="sng" algn="ctr" cap="flat">
+                      <a:solidFill>
+                        <a:srgbClr val="FFFFFF">
+                          <a:alpha val="0"/>
+                        </a:srgbClr>
+                      </a:solidFill>
+                      <a:prstDash val="solid"/>
+                    </a:lnB>
+                  </a:tcPr>
+                </a:tc>
+                <a:tc>
+                  <a:txBody>
+                    <a:bodyPr/>
+                    <a:lstStyle/>
+                    <a:p>
+                      <a:pPr algn="r" marL="63500" marR="63500">
+                        <a:spcBef>
+                          <a:spcPts val="200"/>
+                        </a:spcBef>
+                        <a:spcAft>
+                          <a:spcPts val="200"/>
+                        </a:spcAft>
+                        <a:buNone/>
+                      </a:pPr>
+                      <a:r>
+                        <a:rPr sz="1100">
+                          <a:solidFill>
+                            <a:srgbClr val="111111">
+                              <a:alpha val="100000"/>
+                            </a:srgbClr>
+                          </a:solidFill>
+                          <a:latin typeface="Arial"/>
+                          <a:cs typeface="Arial"/>
+                          <a:highlight>
+                            <a:srgbClr val="FFFFFF">
+                              <a:alpha val="0"/>
+                            </a:srgbClr>
+                          </a:highlight>
+                        </a:rPr>
+                        <a:t>19</a:t>
+                      </a:r>
+                    </a:p>
+                  </a:txBody>
+                  <a:tcPr anchor="ctr" marB="0" marT="0" marR="0" marL="0">
+                    <a:lnL w="0" cmpd="sng" algn="ctr" cap="flat">
+                      <a:solidFill>
+                        <a:srgbClr val="FFFFFF">
+                          <a:alpha val="0"/>
+                        </a:srgbClr>
+                      </a:solidFill>
+                      <a:prstDash val="solid"/>
+                    </a:lnL>
+                    <a:lnR w="0" cmpd="sng" algn="ctr" cap="flat">
+                      <a:solidFill>
+                        <a:srgbClr val="FFFFFF">
+                          <a:alpha val="0"/>
+                        </a:srgbClr>
+                      </a:solidFill>
+                      <a:prstDash val="solid"/>
+                    </a:lnR>
+                    <a:lnT w="0" cmpd="sng" algn="ctr" cap="flat">
+                      <a:solidFill>
+                        <a:srgbClr val="FFFFFF">
+                          <a:alpha val="0"/>
+                        </a:srgbClr>
+                      </a:solidFill>
+                      <a:prstDash val="solid"/>
+                    </a:lnT>
+                    <a:lnB w="0" cmpd="sng" algn="ctr" cap="flat">
+                      <a:solidFill>
+                        <a:srgbClr val="FFFFFF">
+                          <a:alpha val="0"/>
+                        </a:srgbClr>
+                      </a:solidFill>
+                      <a:prstDash val="solid"/>
+                    </a:lnB>
+                  </a:tcPr>
+                </a:tc>
+              </a:tr>
+              <a:tr h="260972">
+                <a:tc>
+                  <a:txBody>
+                    <a:bodyPr/>
+                    <a:lstStyle/>
+                    <a:p>
+                      <a:pPr algn="l" marL="63500" marR="63500">
+                        <a:spcBef>
+                          <a:spcPts val="200"/>
+                        </a:spcBef>
+                        <a:spcAft>
+                          <a:spcPts val="200"/>
+                        </a:spcAft>
+                        <a:buNone/>
+                      </a:pPr>
+                      <a:r>
+                        <a:rPr sz="1100">
+                          <a:solidFill>
+                            <a:srgbClr val="111111">
+                              <a:alpha val="100000"/>
+                            </a:srgbClr>
+                          </a:solidFill>
+                          <a:latin typeface="Arial"/>
+                          <a:cs typeface="Arial"/>
+                          <a:highlight>
+                            <a:srgbClr val="FFFFFF">
+                              <a:alpha val="0"/>
+                            </a:srgbClr>
+                          </a:highlight>
+                        </a:rPr>
+                        <a:t>TRUE</a:t>
+                      </a:r>
+                    </a:p>
+                  </a:txBody>
+                  <a:tcPr anchor="ctr" marB="0" marT="0" marR="0" marL="0">
+                    <a:lnL w="0" cmpd="sng" algn="ctr" cap="flat">
+                      <a:solidFill>
+                        <a:srgbClr val="FFFFFF">
+                          <a:alpha val="0"/>
+                        </a:srgbClr>
+                      </a:solidFill>
+                      <a:prstDash val="solid"/>
+                    </a:lnL>
+                    <a:lnR w="0" cmpd="sng" algn="ctr" cap="flat">
+                      <a:solidFill>
+                        <a:srgbClr val="FFFFFF">
+                          <a:alpha val="0"/>
+                        </a:srgbClr>
+                      </a:solidFill>
+                      <a:prstDash val="solid"/>
+                    </a:lnR>
+                    <a:lnT w="0" cmpd="sng" algn="ctr" cap="flat">
+                      <a:solidFill>
+                        <a:srgbClr val="FFFFFF">
+                          <a:alpha val="0"/>
+                        </a:srgbClr>
+                      </a:solidFill>
+                      <a:prstDash val="solid"/>
+                    </a:lnT>
+                    <a:lnB w="0" cmpd="sng" algn="ctr" cap="flat">
+                      <a:solidFill>
+                        <a:srgbClr val="FFFFFF">
+                          <a:alpha val="0"/>
+                        </a:srgbClr>
+                      </a:solidFill>
+                      <a:prstDash val="solid"/>
+                    </a:lnB>
+                  </a:tcPr>
+                </a:tc>
+                <a:tc>
+                  <a:txBody>
+                    <a:bodyPr/>
+                    <a:lstStyle/>
+                    <a:p>
+                      <a:pPr algn="r" marL="63500" marR="63500">
+                        <a:spcBef>
+                          <a:spcPts val="200"/>
+                        </a:spcBef>
+                        <a:spcAft>
+                          <a:spcPts val="200"/>
+                        </a:spcAft>
+                        <a:buNone/>
+                      </a:pPr>
+                      <a:r>
+                        <a:rPr sz="1100">
+                          <a:solidFill>
+                            <a:srgbClr val="111111">
+                              <a:alpha val="100000"/>
+                            </a:srgbClr>
+                          </a:solidFill>
+                          <a:latin typeface="Arial"/>
+                          <a:cs typeface="Arial"/>
+                          <a:highlight>
+                            <a:srgbClr val="FFFFFF">
+                              <a:alpha val="0"/>
+                            </a:srgbClr>
+                          </a:highlight>
+                        </a:rPr>
+                        <a:t>1</a:t>
+                      </a:r>
+                    </a:p>
+                  </a:txBody>
+                  <a:tcPr anchor="ctr" marB="0" marT="0" marR="0" marL="0">
+                    <a:lnL w="0" cmpd="sng" algn="ctr" cap="flat">
+                      <a:solidFill>
+                        <a:srgbClr val="FFFFFF">
+                          <a:alpha val="0"/>
+                        </a:srgbClr>
+                      </a:solidFill>
+                      <a:prstDash val="solid"/>
+                    </a:lnL>
+                    <a:lnR w="0" cmpd="sng" algn="ctr" cap="flat">
+                      <a:solidFill>
+                        <a:srgbClr val="FFFFFF">
+                          <a:alpha val="0"/>
+                        </a:srgbClr>
+                      </a:solidFill>
+                      <a:prstDash val="solid"/>
+                    </a:lnR>
+                    <a:lnT w="0" cmpd="sng" algn="ctr" cap="flat">
+                      <a:solidFill>
+                        <a:srgbClr val="FFFFFF">
+                          <a:alpha val="0"/>
+                        </a:srgbClr>
+                      </a:solidFill>
+                      <a:prstDash val="solid"/>
+                    </a:lnT>
+                    <a:lnB w="0" cmpd="sng" algn="ctr" cap="flat">
+                      <a:solidFill>
+                        <a:srgbClr val="FFFFFF">
+                          <a:alpha val="0"/>
+                        </a:srgbClr>
+                      </a:solidFill>
+                      <a:prstDash val="solid"/>
+                    </a:lnB>
+                  </a:tcPr>
+                </a:tc>
+              </a:tr>
+              <a:tr h="261369">
+                <a:tc>
+                  <a:txBody>
+                    <a:bodyPr/>
+                    <a:lstStyle/>
+                    <a:p>
+                      <a:pPr algn="l" marL="63500" marR="63500">
+                        <a:spcBef>
+                          <a:spcPts val="200"/>
+                        </a:spcBef>
+                        <a:spcAft>
+                          <a:spcPts val="200"/>
+                        </a:spcAft>
+                        <a:buNone/>
+                      </a:pPr>
+                      <a:r>
+                        <a:rPr sz="1100">
+                          <a:solidFill>
+                            <a:srgbClr val="111111">
+                              <a:alpha val="100000"/>
+                            </a:srgbClr>
+                          </a:solidFill>
+                          <a:latin typeface="Arial"/>
+                          <a:cs typeface="Arial"/>
+                          <a:highlight>
+                            <a:srgbClr val="FFFFFF">
+                              <a:alpha val="0"/>
+                            </a:srgbClr>
+                          </a:highlight>
+                        </a:rPr>
+                        <a:t>Total</a:t>
+                      </a:r>
+                    </a:p>
+                  </a:txBody>
+                  <a:tcPr anchor="ctr" marB="0" marT="0" marR="0" marL="0">
+                    <a:lnL w="0" cmpd="sng" algn="ctr" cap="flat">
+                      <a:solidFill>
+                        <a:srgbClr val="FFFFFF">
+                          <a:alpha val="0"/>
+                        </a:srgbClr>
+                      </a:solidFill>
+                      <a:prstDash val="solid"/>
+                    </a:lnL>
+                    <a:lnR w="0" cmpd="sng" algn="ctr" cap="flat">
+                      <a:solidFill>
+                        <a:srgbClr val="FFFFFF">
+                          <a:alpha val="0"/>
+                        </a:srgbClr>
+                      </a:solidFill>
+                      <a:prstDash val="solid"/>
+                    </a:lnR>
+                    <a:lnT w="0" cmpd="sng" algn="ctr" cap="flat">
+                      <a:solidFill>
+                        <a:srgbClr val="FFFFFF">
+                          <a:alpha val="0"/>
+                        </a:srgbClr>
+                      </a:solidFill>
+                      <a:prstDash val="solid"/>
+                    </a:lnT>
+                    <a:lnB w="25400" cmpd="sng" algn="ctr" cap="flat">
+                      <a:solidFill>
+                        <a:srgbClr val="000000">
+                          <a:alpha val="100000"/>
+                        </a:srgbClr>
+                      </a:solidFill>
+                      <a:prstDash val="solid"/>
+                    </a:lnB>
+                  </a:tcPr>
+                </a:tc>
+                <a:tc>
+                  <a:txBody>
+                    <a:bodyPr/>
+                    <a:lstStyle/>
+                    <a:p>
+                      <a:pPr algn="r" marL="63500" marR="63500">
+                        <a:spcBef>
+                          <a:spcPts val="200"/>
+                        </a:spcBef>
+                        <a:spcAft>
+                          <a:spcPts val="200"/>
+                        </a:spcAft>
+                        <a:buNone/>
+                      </a:pPr>
+                      <a:r>
+                        <a:rPr sz="1100">
+                          <a:solidFill>
+                            <a:srgbClr val="111111">
+                              <a:alpha val="100000"/>
+                            </a:srgbClr>
+                          </a:solidFill>
+                          <a:latin typeface="Arial"/>
+                          <a:cs typeface="Arial"/>
+                          <a:highlight>
+                            <a:srgbClr val="FFFFFF">
+                              <a:alpha val="0"/>
+                            </a:srgbClr>
+                          </a:highlight>
+                        </a:rPr>
+                        <a:t>20</a:t>
+                      </a:r>
+                    </a:p>
+                  </a:txBody>
+                  <a:tcPr anchor="ctr" marB="0" marT="0" marR="0" marL="0">
+                    <a:lnL w="0" cmpd="sng" algn="ctr" cap="flat">
+                      <a:solidFill>
+                        <a:srgbClr val="FFFFFF">
+                          <a:alpha val="0"/>
+                        </a:srgbClr>
+                      </a:solidFill>
+                      <a:prstDash val="solid"/>
+                    </a:lnL>
+                    <a:lnR w="0" cmpd="sng" algn="ctr" cap="flat">
+                      <a:solidFill>
+                        <a:srgbClr val="FFFFFF">
+                          <a:alpha val="0"/>
+                        </a:srgbClr>
+                      </a:solidFill>
+                      <a:prstDash val="solid"/>
+                    </a:lnR>
+                    <a:lnT w="0" cmpd="sng" algn="ctr" cap="flat">
+                      <a:solidFill>
+                        <a:srgbClr val="FFFFFF">
+                          <a:alpha val="0"/>
+                        </a:srgbClr>
+                      </a:solidFill>
+                      <a:prstDash val="solid"/>
+                    </a:lnT>
+                    <a:lnB w="25400" cmpd="sng" algn="ctr" cap="flat">
+                      <a:solidFill>
+                        <a:srgbClr val="000000">
+                          <a:alpha val="100000"/>
+                        </a:srgbClr>
+                      </a:solidFill>
+                      <a:prstDash val="solid"/>
+                    </a:lnB>
+                  </a:tcPr>
+                </a:tc>
+              </a:tr>
+            </a:tbl>
+          </a:graphicData>
+        </a:graphic>
+      </p:graphicFrame>
+      <p:sp>
+        <p:nvSpPr>
+          <p:cNvPr id="3" name="Content Placeholder 2"/>
+          <p:cNvSpPr>
+            <a:spLocks noGrp="1"/>
+          </p:cNvSpPr>
+          <p:nvPr>
+            <p:ph idx="1"/>
+          </p:nvPr>
+        </p:nvSpPr>
+        <p:spPr/>
+        <p:txBody>
+          <a:bodyPr/>
+          <a:lstStyle/>
+          <a:p>
+            <a:pPr lvl="0" marL="1270000" indent="0">
+              <a:buNone/>
+            </a:pPr>
+            <a:r>
+              <a:rPr sz="1800" b="1">
+                <a:solidFill>
+                  <a:srgbClr val="007020"/>
+                </a:solidFill>
+                <a:latin typeface="Courier"/>
+              </a:rPr>
+              <a:t>flextable</a:t>
+            </a:r>
+            <a:r>
+              <a:rPr sz="1800">
+                <a:latin typeface="Courier"/>
+              </a:rPr>
+              <a:t>(fpse_dayNight) </a:t>
+            </a:r>
+            <a:r>
+              <a:rPr sz="1800">
+                <a:solidFill>
+                  <a:srgbClr val="666666"/>
+                </a:solidFill>
+                <a:latin typeface="Courier"/>
+              </a:rPr>
+              <a:t>%&gt;%</a:t>
+            </a:r>
+            <a:r>
+              <a:rPr sz="1800">
+                <a:solidFill>
+                  <a:srgbClr val="4070A0"/>
+                </a:solidFill>
+                <a:latin typeface="Courier"/>
+              </a:rPr>
+              <a:t> </a:t>
+            </a:r>
+            <a:br/>
+            <a:br/>
+            <a:r>
+              <a:rPr sz="1800">
+                <a:solidFill>
+                  <a:srgbClr val="4070A0"/>
+                </a:solidFill>
+                <a:latin typeface="Courier"/>
+              </a:rPr>
+              <a:t>  </a:t>
+            </a:r>
+            <a:r>
+              <a:rPr sz="1800" b="1">
+                <a:solidFill>
+                  <a:srgbClr val="007020"/>
+                </a:solidFill>
+                <a:latin typeface="Courier"/>
+              </a:rPr>
+              <a:t>autofit</a:t>
+            </a:r>
+            <a:r>
+              <a:rPr sz="1800">
+                <a:latin typeface="Courier"/>
+              </a:rPr>
+              <a:t>()</a:t>
+            </a:r>
+          </a:p>
+        </p:txBody>
+      </p:sp>
+      <p:graphicFrame xmlns:a="http://schemas.openxmlformats.org/drawingml/2006/main" xmlns:r="http://schemas.openxmlformats.org/officeDocument/2006/relationships" xmlns:p="http://schemas.openxmlformats.org/presentationml/2006/main">
+        <p:nvGraphicFramePr>
+          <p:cNvPr id="714942431" name=""/>
+          <p:cNvGraphicFramePr>
+            <a:graphicFrameLocks noGrp="true"/>
+          </p:cNvGraphicFramePr>
+          <p:nvPr/>
+        </p:nvGraphicFramePr>
+        <p:xfrm rot="0">
+          <a:off x="914400" y="1828800"/>
+          <a:ext cx="9144000" cy="5486400"/>
+        </p:xfrm>
+        <a:graphic>
+          <a:graphicData uri="http://schemas.openxmlformats.org/drawingml/2006/table">
+            <a:tbl>
+              <a:tblPr/>
+              <a:tblGrid>
+                <a:gridCol w="1013775"/>
+                <a:gridCol w="1394131"/>
+              </a:tblGrid>
+              <a:tr h="290341">
+                <a:tc>
+                  <a:txBody>
+                    <a:bodyPr/>
+                    <a:lstStyle/>
+                    <a:p>
+                      <a:pPr algn="l" marL="63500" marR="63500">
+                        <a:spcBef>
+                          <a:spcPts val="200"/>
+                        </a:spcBef>
+                        <a:spcAft>
+                          <a:spcPts val="200"/>
+                        </a:spcAft>
+                        <a:buNone/>
+                      </a:pPr>
+                      <a:r>
+                        <a:rPr sz="1100">
+                          <a:solidFill>
+                            <a:srgbClr val="111111">
+                              <a:alpha val="100000"/>
+                            </a:srgbClr>
+                          </a:solidFill>
+                          <a:latin typeface="Arial"/>
+                          <a:cs typeface="Arial"/>
+                          <a:highlight>
+                            <a:srgbClr val="FFFFFF">
+                              <a:alpha val="0"/>
+                            </a:srgbClr>
+                          </a:highlight>
+                        </a:rPr>
+                        <a:t>Time of Day</a:t>
+                      </a:r>
+                    </a:p>
+                  </a:txBody>
+                  <a:tcPr anchor="ctr" marB="0" marT="0" marR="0" marL="0">
+                    <a:lnL w="0" cmpd="sng" algn="ctr" cap="flat">
+                      <a:solidFill>
+                        <a:srgbClr val="FFFFFF">
+                          <a:alpha val="0"/>
+                        </a:srgbClr>
+                      </a:solidFill>
+                      <a:prstDash val="solid"/>
+                    </a:lnL>
+                    <a:lnR w="0" cmpd="sng" algn="ctr" cap="flat">
+                      <a:solidFill>
+                        <a:srgbClr val="FFFFFF">
+                          <a:alpha val="0"/>
+                        </a:srgbClr>
+                      </a:solidFill>
+                      <a:prstDash val="solid"/>
+                    </a:lnR>
+                    <a:lnT w="25400" cmpd="sng" algn="ctr" cap="flat">
+                      <a:solidFill>
+                        <a:srgbClr val="000000">
+                          <a:alpha val="100000"/>
+                        </a:srgbClr>
+                      </a:solidFill>
+                      <a:prstDash val="solid"/>
+                    </a:lnT>
+                    <a:lnB w="25400" cmpd="sng" algn="ctr" cap="flat">
+                      <a:solidFill>
+                        <a:srgbClr val="000000">
+                          <a:alpha val="100000"/>
+                        </a:srgbClr>
+                      </a:solidFill>
+                      <a:prstDash val="solid"/>
+                    </a:lnB>
+                  </a:tcPr>
+                </a:tc>
+                <a:tc>
+                  <a:txBody>
+                    <a:bodyPr/>
+                    <a:lstStyle/>
+                    <a:p>
+                      <a:pPr algn="r" marL="63500" marR="63500">
+                        <a:spcBef>
+                          <a:spcPts val="200"/>
+                        </a:spcBef>
+                        <a:spcAft>
+                          <a:spcPts val="200"/>
+                        </a:spcAft>
+                        <a:buNone/>
+                      </a:pPr>
+                      <a:r>
+                        <a:rPr sz="1100">
+                          <a:solidFill>
+                            <a:srgbClr val="111111">
+                              <a:alpha val="100000"/>
+                            </a:srgbClr>
+                          </a:solidFill>
+                          <a:latin typeface="Arial"/>
+                          <a:cs typeface="Arial"/>
+                          <a:highlight>
+                            <a:srgbClr val="FFFFFF">
+                              <a:alpha val="0"/>
+                            </a:srgbClr>
+                          </a:highlight>
+                        </a:rPr>
+                        <a:t>Number of Crimes</a:t>
+                      </a:r>
+                    </a:p>
+                  </a:txBody>
+                  <a:tcPr anchor="ctr" marB="0" marT="0" marR="0" marL="0">
+                    <a:lnL w="0" cmpd="sng" algn="ctr" cap="flat">
+                      <a:solidFill>
+                        <a:srgbClr val="FFFFFF">
+                          <a:alpha val="0"/>
+                        </a:srgbClr>
+                      </a:solidFill>
+                      <a:prstDash val="solid"/>
+                    </a:lnL>
+                    <a:lnR w="0" cmpd="sng" algn="ctr" cap="flat">
+                      <a:solidFill>
+                        <a:srgbClr val="FFFFFF">
+                          <a:alpha val="0"/>
+                        </a:srgbClr>
+                      </a:solidFill>
+                      <a:prstDash val="solid"/>
+                    </a:lnR>
+                    <a:lnT w="25400" cmpd="sng" algn="ctr" cap="flat">
+                      <a:solidFill>
+                        <a:srgbClr val="000000">
+                          <a:alpha val="100000"/>
+                        </a:srgbClr>
+                      </a:solidFill>
+                      <a:prstDash val="solid"/>
+                    </a:lnT>
+                    <a:lnB w="25400" cmpd="sng" algn="ctr" cap="flat">
+                      <a:solidFill>
+                        <a:srgbClr val="000000">
+                          <a:alpha val="100000"/>
+                        </a:srgbClr>
+                      </a:solidFill>
+                      <a:prstDash val="solid"/>
+                    </a:lnB>
+                  </a:tcPr>
+                </a:tc>
+              </a:tr>
+              <a:tr h="288555">
+                <a:tc>
+                  <a:txBody>
+                    <a:bodyPr/>
+                    <a:lstStyle/>
+                    <a:p>
+                      <a:pPr algn="l" marL="63500" marR="63500">
+                        <a:spcBef>
+                          <a:spcPts val="200"/>
+                        </a:spcBef>
+                        <a:spcAft>
+                          <a:spcPts val="200"/>
+                        </a:spcAft>
+                        <a:buNone/>
+                      </a:pPr>
+                      <a:r>
+                        <a:rPr sz="1100">
+                          <a:solidFill>
+                            <a:srgbClr val="111111">
+                              <a:alpha val="100000"/>
+                            </a:srgbClr>
+                          </a:solidFill>
+                          <a:latin typeface="Arial"/>
+                          <a:cs typeface="Arial"/>
+                          <a:highlight>
+                            <a:srgbClr val="FFFFFF">
+                              <a:alpha val="0"/>
+                            </a:srgbClr>
+                          </a:highlight>
+                        </a:rPr>
+                        <a:t>Day</a:t>
+                      </a:r>
+                    </a:p>
+                  </a:txBody>
+                  <a:tcPr anchor="ctr" marB="0" marT="0" marR="0" marL="0">
+                    <a:lnL w="0" cmpd="sng" algn="ctr" cap="flat">
+                      <a:solidFill>
+                        <a:srgbClr val="FFFFFF">
+                          <a:alpha val="0"/>
+                        </a:srgbClr>
+                      </a:solidFill>
+                      <a:prstDash val="solid"/>
+                    </a:lnL>
+                    <a:lnR w="0" cmpd="sng" algn="ctr" cap="flat">
+                      <a:solidFill>
+                        <a:srgbClr val="FFFFFF">
+                          <a:alpha val="0"/>
+                        </a:srgbClr>
+                      </a:solidFill>
+                      <a:prstDash val="solid"/>
+                    </a:lnR>
+                    <a:lnT w="0" cmpd="sng" algn="ctr" cap="flat">
+                      <a:solidFill>
+                        <a:srgbClr val="FFFFFF">
+                          <a:alpha val="0"/>
+                        </a:srgbClr>
+                      </a:solidFill>
+                      <a:prstDash val="solid"/>
+                    </a:lnT>
+                    <a:lnB w="0" cmpd="sng" algn="ctr" cap="flat">
+                      <a:solidFill>
+                        <a:srgbClr val="FFFFFF">
+                          <a:alpha val="0"/>
+                        </a:srgbClr>
+                      </a:solidFill>
+                      <a:prstDash val="solid"/>
+                    </a:lnB>
+                  </a:tcPr>
+                </a:tc>
+                <a:tc>
+                  <a:txBody>
+                    <a:bodyPr/>
+                    <a:lstStyle/>
+                    <a:p>
+                      <a:pPr algn="r" marL="63500" marR="63500">
+                        <a:spcBef>
+                          <a:spcPts val="200"/>
+                        </a:spcBef>
+                        <a:spcAft>
+                          <a:spcPts val="200"/>
+                        </a:spcAft>
+                        <a:buNone/>
+                      </a:pPr>
+                      <a:r>
+                        <a:rPr sz="1100">
+                          <a:solidFill>
+                            <a:srgbClr val="111111">
+                              <a:alpha val="100000"/>
+                            </a:srgbClr>
+                          </a:solidFill>
+                          <a:latin typeface="Arial"/>
+                          <a:cs typeface="Arial"/>
+                          <a:highlight>
+                            <a:srgbClr val="FFFFFF">
+                              <a:alpha val="0"/>
+                            </a:srgbClr>
+                          </a:highlight>
+                        </a:rPr>
+                        <a:t>15</a:t>
+                      </a:r>
+                    </a:p>
+                  </a:txBody>
+                  <a:tcPr anchor="ctr" marB="0" marT="0" marR="0" marL="0">
+                    <a:lnL w="0" cmpd="sng" algn="ctr" cap="flat">
+                      <a:solidFill>
+                        <a:srgbClr val="FFFFFF">
+                          <a:alpha val="0"/>
+                        </a:srgbClr>
+                      </a:solidFill>
+                      <a:prstDash val="solid"/>
+                    </a:lnL>
+                    <a:lnR w="0" cmpd="sng" algn="ctr" cap="flat">
+                      <a:solidFill>
+                        <a:srgbClr val="FFFFFF">
+                          <a:alpha val="0"/>
+                        </a:srgbClr>
+                      </a:solidFill>
+                      <a:prstDash val="solid"/>
+                    </a:lnR>
+                    <a:lnT w="0" cmpd="sng" algn="ctr" cap="flat">
+                      <a:solidFill>
+                        <a:srgbClr val="FFFFFF">
+                          <a:alpha val="0"/>
+                        </a:srgbClr>
+                      </a:solidFill>
+                      <a:prstDash val="solid"/>
+                    </a:lnT>
+                    <a:lnB w="0" cmpd="sng" algn="ctr" cap="flat">
+                      <a:solidFill>
+                        <a:srgbClr val="FFFFFF">
+                          <a:alpha val="0"/>
+                        </a:srgbClr>
+                      </a:solidFill>
+                      <a:prstDash val="solid"/>
+                    </a:lnB>
+                  </a:tcPr>
+                </a:tc>
+              </a:tr>
+              <a:tr h="288555">
+                <a:tc>
+                  <a:txBody>
+                    <a:bodyPr/>
+                    <a:lstStyle/>
+                    <a:p>
+                      <a:pPr algn="l" marL="63500" marR="63500">
+                        <a:spcBef>
+                          <a:spcPts val="200"/>
+                        </a:spcBef>
+                        <a:spcAft>
+                          <a:spcPts val="200"/>
+                        </a:spcAft>
+                        <a:buNone/>
+                      </a:pPr>
+                      <a:r>
+                        <a:rPr sz="1100">
+                          <a:solidFill>
+                            <a:srgbClr val="111111">
+                              <a:alpha val="100000"/>
+                            </a:srgbClr>
+                          </a:solidFill>
+                          <a:latin typeface="Arial"/>
+                          <a:cs typeface="Arial"/>
+                          <a:highlight>
+                            <a:srgbClr val="FFFFFF">
+                              <a:alpha val="0"/>
+                            </a:srgbClr>
+                          </a:highlight>
+                        </a:rPr>
+                        <a:t>Night</a:t>
+                      </a:r>
+                    </a:p>
+                  </a:txBody>
+                  <a:tcPr anchor="ctr" marB="0" marT="0" marR="0" marL="0">
+                    <a:lnL w="0" cmpd="sng" algn="ctr" cap="flat">
+                      <a:solidFill>
+                        <a:srgbClr val="FFFFFF">
+                          <a:alpha val="0"/>
+                        </a:srgbClr>
+                      </a:solidFill>
+                      <a:prstDash val="solid"/>
+                    </a:lnL>
+                    <a:lnR w="0" cmpd="sng" algn="ctr" cap="flat">
+                      <a:solidFill>
+                        <a:srgbClr val="FFFFFF">
+                          <a:alpha val="0"/>
+                        </a:srgbClr>
+                      </a:solidFill>
+                      <a:prstDash val="solid"/>
+                    </a:lnR>
+                    <a:lnT w="0" cmpd="sng" algn="ctr" cap="flat">
+                      <a:solidFill>
+                        <a:srgbClr val="FFFFFF">
+                          <a:alpha val="0"/>
+                        </a:srgbClr>
+                      </a:solidFill>
+                      <a:prstDash val="solid"/>
+                    </a:lnT>
+                    <a:lnB w="0" cmpd="sng" algn="ctr" cap="flat">
+                      <a:solidFill>
+                        <a:srgbClr val="FFFFFF">
+                          <a:alpha val="0"/>
+                        </a:srgbClr>
+                      </a:solidFill>
+                      <a:prstDash val="solid"/>
+                    </a:lnB>
+                  </a:tcPr>
+                </a:tc>
+                <a:tc>
+                  <a:txBody>
+                    <a:bodyPr/>
+                    <a:lstStyle/>
+                    <a:p>
+                      <a:pPr algn="r" marL="63500" marR="63500">
+                        <a:spcBef>
+                          <a:spcPts val="200"/>
+                        </a:spcBef>
+                        <a:spcAft>
+                          <a:spcPts val="200"/>
+                        </a:spcAft>
+                        <a:buNone/>
+                      </a:pPr>
+                      <a:r>
+                        <a:rPr sz="1100">
+                          <a:solidFill>
+                            <a:srgbClr val="111111">
+                              <a:alpha val="100000"/>
+                            </a:srgbClr>
+                          </a:solidFill>
+                          <a:latin typeface="Arial"/>
+                          <a:cs typeface="Arial"/>
+                          <a:highlight>
+                            <a:srgbClr val="FFFFFF">
+                              <a:alpha val="0"/>
+                            </a:srgbClr>
+                          </a:highlight>
+                        </a:rPr>
+                        <a:t>5</a:t>
+                      </a:r>
+                    </a:p>
+                  </a:txBody>
+                  <a:tcPr anchor="ctr" marB="0" marT="0" marR="0" marL="0">
+                    <a:lnL w="0" cmpd="sng" algn="ctr" cap="flat">
+                      <a:solidFill>
+                        <a:srgbClr val="FFFFFF">
+                          <a:alpha val="0"/>
+                        </a:srgbClr>
+                      </a:solidFill>
+                      <a:prstDash val="solid"/>
+                    </a:lnL>
+                    <a:lnR w="0" cmpd="sng" algn="ctr" cap="flat">
+                      <a:solidFill>
+                        <a:srgbClr val="FFFFFF">
+                          <a:alpha val="0"/>
+                        </a:srgbClr>
+                      </a:solidFill>
+                      <a:prstDash val="solid"/>
+                    </a:lnR>
+                    <a:lnT w="0" cmpd="sng" algn="ctr" cap="flat">
+                      <a:solidFill>
+                        <a:srgbClr val="FFFFFF">
+                          <a:alpha val="0"/>
+                        </a:srgbClr>
+                      </a:solidFill>
+                      <a:prstDash val="solid"/>
+                    </a:lnT>
+                    <a:lnB w="0" cmpd="sng" algn="ctr" cap="flat">
+                      <a:solidFill>
+                        <a:srgbClr val="FFFFFF">
+                          <a:alpha val="0"/>
+                        </a:srgbClr>
+                      </a:solidFill>
+                      <a:prstDash val="solid"/>
+                    </a:lnB>
+                  </a:tcPr>
+                </a:tc>
+              </a:tr>
+              <a:tr h="261369">
+                <a:tc>
+                  <a:txBody>
+                    <a:bodyPr/>
+                    <a:lstStyle/>
+                    <a:p>
+                      <a:pPr algn="l" marL="63500" marR="63500">
+                        <a:spcBef>
+                          <a:spcPts val="200"/>
+                        </a:spcBef>
+                        <a:spcAft>
+                          <a:spcPts val="200"/>
+                        </a:spcAft>
+                        <a:buNone/>
+                      </a:pPr>
+                      <a:r>
+                        <a:rPr sz="1100">
+                          <a:solidFill>
+                            <a:srgbClr val="111111">
+                              <a:alpha val="100000"/>
+                            </a:srgbClr>
+                          </a:solidFill>
+                          <a:latin typeface="Arial"/>
+                          <a:cs typeface="Arial"/>
+                          <a:highlight>
+                            <a:srgbClr val="FFFFFF">
+                              <a:alpha val="0"/>
+                            </a:srgbClr>
+                          </a:highlight>
+                        </a:rPr>
+                        <a:t>Total</a:t>
+                      </a:r>
+                    </a:p>
+                  </a:txBody>
+                  <a:tcPr anchor="ctr" marB="0" marT="0" marR="0" marL="0">
+                    <a:lnL w="0" cmpd="sng" algn="ctr" cap="flat">
+                      <a:solidFill>
+                        <a:srgbClr val="FFFFFF">
+                          <a:alpha val="0"/>
+                        </a:srgbClr>
+                      </a:solidFill>
+                      <a:prstDash val="solid"/>
+                    </a:lnL>
+                    <a:lnR w="0" cmpd="sng" algn="ctr" cap="flat">
+                      <a:solidFill>
+                        <a:srgbClr val="FFFFFF">
+                          <a:alpha val="0"/>
+                        </a:srgbClr>
+                      </a:solidFill>
+                      <a:prstDash val="solid"/>
+                    </a:lnR>
+                    <a:lnT w="0" cmpd="sng" algn="ctr" cap="flat">
+                      <a:solidFill>
+                        <a:srgbClr val="FFFFFF">
+                          <a:alpha val="0"/>
+                        </a:srgbClr>
+                      </a:solidFill>
+                      <a:prstDash val="solid"/>
+                    </a:lnT>
+                    <a:lnB w="25400" cmpd="sng" algn="ctr" cap="flat">
+                      <a:solidFill>
+                        <a:srgbClr val="000000">
+                          <a:alpha val="100000"/>
+                        </a:srgbClr>
+                      </a:solidFill>
+                      <a:prstDash val="solid"/>
+                    </a:lnB>
+                  </a:tcPr>
+                </a:tc>
+                <a:tc>
+                  <a:txBody>
+                    <a:bodyPr/>
+                    <a:lstStyle/>
+                    <a:p>
+                      <a:pPr algn="r" marL="63500" marR="63500">
+                        <a:spcBef>
+                          <a:spcPts val="200"/>
+                        </a:spcBef>
+                        <a:spcAft>
+                          <a:spcPts val="200"/>
+                        </a:spcAft>
+                        <a:buNone/>
+                      </a:pPr>
+                      <a:r>
+                        <a:rPr sz="1100">
+                          <a:solidFill>
+                            <a:srgbClr val="111111">
+                              <a:alpha val="100000"/>
+                            </a:srgbClr>
+                          </a:solidFill>
+                          <a:latin typeface="Arial"/>
+                          <a:cs typeface="Arial"/>
+                          <a:highlight>
+                            <a:srgbClr val="FFFFFF">
+                              <a:alpha val="0"/>
+                            </a:srgbClr>
+                          </a:highlight>
+                        </a:rPr>
+                        <a:t>20</a:t>
                       </a:r>
                     </a:p>
                   </a:txBody>

</xml_diff>